<commit_message>
Site updated: 2017-03-19 13:32:20
</commit_message>
<xml_diff>
--- a/2017/03/08/vrpAndor-tools/or-tools.pptx
+++ b/2017/03/08/vrpAndor-tools/or-tools.pptx
@@ -5,7 +5,7 @@
     <p:sldMasterId id="2147483660" r:id="rId1"/>
   </p:sldMasterIdLst>
   <p:notesMasterIdLst>
-    <p:notesMasterId r:id="rId46"/>
+    <p:notesMasterId r:id="rId50"/>
   </p:notesMasterIdLst>
   <p:sldIdLst>
     <p:sldId id="256" r:id="rId2"/>
@@ -31,27 +31,31 @@
     <p:sldId id="314" r:id="rId22"/>
     <p:sldId id="315" r:id="rId23"/>
     <p:sldId id="316" r:id="rId24"/>
-    <p:sldId id="271" r:id="rId25"/>
-    <p:sldId id="273" r:id="rId26"/>
-    <p:sldId id="274" r:id="rId27"/>
-    <p:sldId id="298" r:id="rId28"/>
-    <p:sldId id="275" r:id="rId29"/>
-    <p:sldId id="276" r:id="rId30"/>
-    <p:sldId id="280" r:id="rId31"/>
-    <p:sldId id="281" r:id="rId32"/>
-    <p:sldId id="299" r:id="rId33"/>
-    <p:sldId id="300" r:id="rId34"/>
-    <p:sldId id="282" r:id="rId35"/>
-    <p:sldId id="283" r:id="rId36"/>
-    <p:sldId id="284" r:id="rId37"/>
-    <p:sldId id="301" r:id="rId38"/>
-    <p:sldId id="285" r:id="rId39"/>
-    <p:sldId id="302" r:id="rId40"/>
-    <p:sldId id="303" r:id="rId41"/>
-    <p:sldId id="286" r:id="rId42"/>
-    <p:sldId id="306" r:id="rId43"/>
-    <p:sldId id="309" r:id="rId44"/>
-    <p:sldId id="296" r:id="rId45"/>
+    <p:sldId id="318" r:id="rId25"/>
+    <p:sldId id="319" r:id="rId26"/>
+    <p:sldId id="320" r:id="rId27"/>
+    <p:sldId id="321" r:id="rId28"/>
+    <p:sldId id="271" r:id="rId29"/>
+    <p:sldId id="273" r:id="rId30"/>
+    <p:sldId id="274" r:id="rId31"/>
+    <p:sldId id="298" r:id="rId32"/>
+    <p:sldId id="275" r:id="rId33"/>
+    <p:sldId id="276" r:id="rId34"/>
+    <p:sldId id="280" r:id="rId35"/>
+    <p:sldId id="281" r:id="rId36"/>
+    <p:sldId id="299" r:id="rId37"/>
+    <p:sldId id="300" r:id="rId38"/>
+    <p:sldId id="282" r:id="rId39"/>
+    <p:sldId id="283" r:id="rId40"/>
+    <p:sldId id="284" r:id="rId41"/>
+    <p:sldId id="301" r:id="rId42"/>
+    <p:sldId id="285" r:id="rId43"/>
+    <p:sldId id="302" r:id="rId44"/>
+    <p:sldId id="303" r:id="rId45"/>
+    <p:sldId id="286" r:id="rId46"/>
+    <p:sldId id="306" r:id="rId47"/>
+    <p:sldId id="309" r:id="rId48"/>
+    <p:sldId id="296" r:id="rId49"/>
   </p:sldIdLst>
   <p:sldSz cx="9144000" cy="6858000" type="screen4x3"/>
   <p:notesSz cx="6858000" cy="9144000"/>
@@ -240,7 +244,7 @@
           <a:p>
             <a:fld id="{EB7AECD6-7EB9-42A0-BC40-CDC3A2981F74}" type="datetimeFigureOut">
               <a:rPr lang="zh-CN" altLang="en-US" smtClean="0"/>
-              <a:t>2017/3/10</a:t>
+              <a:t>2017/3/16</a:t>
             </a:fld>
             <a:endParaRPr lang="zh-CN" altLang="en-US"/>
           </a:p>
@@ -1777,6 +1781,772 @@
 </p:notes>
 </file>
 
+<file path=ppt/notesSlides/notesSlide13.xml><?xml version="1.0" encoding="utf-8"?>
+<p:notes xmlns:a="http://schemas.openxmlformats.org/drawingml/2006/main" xmlns:r="http://schemas.openxmlformats.org/officeDocument/2006/relationships" xmlns:p="http://schemas.openxmlformats.org/presentationml/2006/main">
+  <p:cSld>
+    <p:spTree>
+      <p:nvGrpSpPr>
+        <p:cNvPr id="1" name=""/>
+        <p:cNvGrpSpPr/>
+        <p:nvPr/>
+      </p:nvGrpSpPr>
+      <p:grpSpPr>
+        <a:xfrm>
+          <a:off x="0" y="0"/>
+          <a:ext cx="0" cy="0"/>
+          <a:chOff x="0" y="0"/>
+          <a:chExt cx="0" cy="0"/>
+        </a:xfrm>
+      </p:grpSpPr>
+      <p:sp>
+        <p:nvSpPr>
+          <p:cNvPr id="2" name="幻灯片图像占位符 1"/>
+          <p:cNvSpPr>
+            <a:spLocks noGrp="1" noRot="1" noChangeAspect="1"/>
+          </p:cNvSpPr>
+          <p:nvPr>
+            <p:ph type="sldImg"/>
+          </p:nvPr>
+        </p:nvSpPr>
+        <p:spPr/>
+      </p:sp>
+      <p:sp>
+        <p:nvSpPr>
+          <p:cNvPr id="3" name="备注占位符 2"/>
+          <p:cNvSpPr>
+            <a:spLocks noGrp="1"/>
+          </p:cNvSpPr>
+          <p:nvPr>
+            <p:ph type="body" idx="1"/>
+          </p:nvPr>
+        </p:nvSpPr>
+        <p:spPr/>
+        <p:txBody>
+          <a:bodyPr/>
+          <a:lstStyle/>
+          <a:p>
+            <a:r>
+              <a:rPr lang="en-US" altLang="zh-CN" sz="1200" kern="1200" dirty="0" smtClean="0">
+                <a:solidFill>
+                  <a:schemeClr val="tx1"/>
+                </a:solidFill>
+                <a:effectLst/>
+                <a:latin typeface="+mn-lt"/>
+                <a:ea typeface="+mn-ea"/>
+                <a:cs typeface="+mn-cs"/>
+              </a:rPr>
+              <a:t>// Adds a soft </a:t>
+            </a:r>
+            <a:r>
+              <a:rPr lang="en-US" altLang="zh-CN" sz="1200" kern="1200" dirty="0" err="1" smtClean="0">
+                <a:solidFill>
+                  <a:schemeClr val="tx1"/>
+                </a:solidFill>
+                <a:effectLst/>
+                <a:latin typeface="+mn-lt"/>
+                <a:ea typeface="+mn-ea"/>
+                <a:cs typeface="+mn-cs"/>
+              </a:rPr>
+              <a:t>contraint</a:t>
+            </a:r>
+            <a:r>
+              <a:rPr lang="en-US" altLang="zh-CN" sz="1200" kern="1200" dirty="0" smtClean="0">
+                <a:solidFill>
+                  <a:schemeClr val="tx1"/>
+                </a:solidFill>
+                <a:effectLst/>
+                <a:latin typeface="+mn-lt"/>
+                <a:ea typeface="+mn-ea"/>
+                <a:cs typeface="+mn-cs"/>
+              </a:rPr>
+              <a:t> to force a set of nodes to be on the same vehicle. // If all nodes are not on the same vehicle, each extra vehicle used adds // 'cost' to the cost function.</a:t>
+            </a:r>
+            <a:endParaRPr lang="zh-CN" altLang="en-US" dirty="0"/>
+          </a:p>
+        </p:txBody>
+      </p:sp>
+      <p:sp>
+        <p:nvSpPr>
+          <p:cNvPr id="4" name="灯片编号占位符 3"/>
+          <p:cNvSpPr>
+            <a:spLocks noGrp="1"/>
+          </p:cNvSpPr>
+          <p:nvPr>
+            <p:ph type="sldNum" sz="quarter" idx="10"/>
+          </p:nvPr>
+        </p:nvSpPr>
+        <p:spPr/>
+        <p:txBody>
+          <a:bodyPr/>
+          <a:lstStyle/>
+          <a:p>
+            <a:fld id="{89805CDA-6A0C-4198-AA2F-A0A1AE35D034}" type="slidenum">
+              <a:rPr lang="zh-CN" altLang="en-US" smtClean="0"/>
+              <a:t>24</a:t>
+            </a:fld>
+            <a:endParaRPr lang="zh-CN" altLang="en-US"/>
+          </a:p>
+        </p:txBody>
+      </p:sp>
+    </p:spTree>
+    <p:extLst>
+      <p:ext uri="{BB962C8B-B14F-4D97-AF65-F5344CB8AC3E}">
+        <p14:creationId xmlns:p14="http://schemas.microsoft.com/office/powerpoint/2010/main" val="1062529239"/>
+      </p:ext>
+    </p:extLst>
+  </p:cSld>
+  <p:clrMapOvr>
+    <a:masterClrMapping/>
+  </p:clrMapOvr>
+</p:notes>
+</file>
+
+<file path=ppt/notesSlides/notesSlide14.xml><?xml version="1.0" encoding="utf-8"?>
+<p:notes xmlns:a="http://schemas.openxmlformats.org/drawingml/2006/main" xmlns:r="http://schemas.openxmlformats.org/officeDocument/2006/relationships" xmlns:p="http://schemas.openxmlformats.org/presentationml/2006/main">
+  <p:cSld>
+    <p:spTree>
+      <p:nvGrpSpPr>
+        <p:cNvPr id="1" name=""/>
+        <p:cNvGrpSpPr/>
+        <p:nvPr/>
+      </p:nvGrpSpPr>
+      <p:grpSpPr>
+        <a:xfrm>
+          <a:off x="0" y="0"/>
+          <a:ext cx="0" cy="0"/>
+          <a:chOff x="0" y="0"/>
+          <a:chExt cx="0" cy="0"/>
+        </a:xfrm>
+      </p:grpSpPr>
+      <p:sp>
+        <p:nvSpPr>
+          <p:cNvPr id="2" name="幻灯片图像占位符 1"/>
+          <p:cNvSpPr>
+            <a:spLocks noGrp="1" noRot="1" noChangeAspect="1"/>
+          </p:cNvSpPr>
+          <p:nvPr>
+            <p:ph type="sldImg"/>
+          </p:nvPr>
+        </p:nvSpPr>
+        <p:spPr/>
+      </p:sp>
+      <p:sp>
+        <p:nvSpPr>
+          <p:cNvPr id="3" name="备注占位符 2"/>
+          <p:cNvSpPr>
+            <a:spLocks noGrp="1"/>
+          </p:cNvSpPr>
+          <p:nvPr>
+            <p:ph type="body" idx="1"/>
+          </p:nvPr>
+        </p:nvSpPr>
+        <p:spPr/>
+        <p:txBody>
+          <a:bodyPr/>
+          <a:lstStyle/>
+          <a:p>
+            <a:r>
+              <a:rPr lang="en-US" altLang="zh-CN" sz="1200" kern="1200" dirty="0" smtClean="0">
+                <a:solidFill>
+                  <a:schemeClr val="tx1"/>
+                </a:solidFill>
+                <a:effectLst/>
+                <a:latin typeface="+mn-lt"/>
+                <a:ea typeface="+mn-ea"/>
+                <a:cs typeface="+mn-cs"/>
+              </a:rPr>
+              <a:t>https://github.com/google/or-tools/blob/c11c96f1dce24893de5357e7c643aa6958496ada/src/constraint_solver/routing.h  line 580.</a:t>
+            </a:r>
+          </a:p>
+          <a:p>
+            <a:r>
+              <a:rPr lang="en-US" altLang="zh-CN" sz="1200" kern="1200" dirty="0" smtClean="0">
+                <a:solidFill>
+                  <a:schemeClr val="tx1"/>
+                </a:solidFill>
+                <a:effectLst/>
+                <a:latin typeface="+mn-lt"/>
+                <a:ea typeface="+mn-ea"/>
+                <a:cs typeface="+mn-cs"/>
+              </a:rPr>
+              <a:t>// Notifies that node1 and node2 form a pair of nodes which should belong // to the same route. This methods helps the search find better solutions, // especially in the local search phase. // It should be called each time you have an equality constraint linking // the vehicle variables of two node (including for instance pickup and // delivery problems): // Solver* </a:t>
+            </a:r>
+            <a:r>
+              <a:rPr lang="en-US" altLang="zh-CN" sz="1200" kern="1200" dirty="0" err="1" smtClean="0">
+                <a:solidFill>
+                  <a:schemeClr val="tx1"/>
+                </a:solidFill>
+                <a:effectLst/>
+                <a:latin typeface="+mn-lt"/>
+                <a:ea typeface="+mn-ea"/>
+                <a:cs typeface="+mn-cs"/>
+              </a:rPr>
+              <a:t>const</a:t>
+            </a:r>
+            <a:r>
+              <a:rPr lang="en-US" altLang="zh-CN" sz="1200" kern="1200" dirty="0" smtClean="0">
+                <a:solidFill>
+                  <a:schemeClr val="tx1"/>
+                </a:solidFill>
+                <a:effectLst/>
+                <a:latin typeface="+mn-lt"/>
+                <a:ea typeface="+mn-ea"/>
+                <a:cs typeface="+mn-cs"/>
+              </a:rPr>
+              <a:t> solver = </a:t>
+            </a:r>
+            <a:r>
+              <a:rPr lang="en-US" altLang="zh-CN" sz="1200" kern="1200" dirty="0" err="1" smtClean="0">
+                <a:solidFill>
+                  <a:schemeClr val="tx1"/>
+                </a:solidFill>
+                <a:effectLst/>
+                <a:latin typeface="+mn-lt"/>
+                <a:ea typeface="+mn-ea"/>
+                <a:cs typeface="+mn-cs"/>
+              </a:rPr>
+              <a:t>routing.solver</a:t>
+            </a:r>
+            <a:r>
+              <a:rPr lang="en-US" altLang="zh-CN" sz="1200" kern="1200" dirty="0" smtClean="0">
+                <a:solidFill>
+                  <a:schemeClr val="tx1"/>
+                </a:solidFill>
+                <a:effectLst/>
+                <a:latin typeface="+mn-lt"/>
+                <a:ea typeface="+mn-ea"/>
+                <a:cs typeface="+mn-cs"/>
+              </a:rPr>
+              <a:t>(); // solver-&gt;</a:t>
+            </a:r>
+            <a:r>
+              <a:rPr lang="en-US" altLang="zh-CN" sz="1200" kern="1200" dirty="0" err="1" smtClean="0">
+                <a:solidFill>
+                  <a:schemeClr val="tx1"/>
+                </a:solidFill>
+                <a:effectLst/>
+                <a:latin typeface="+mn-lt"/>
+                <a:ea typeface="+mn-ea"/>
+                <a:cs typeface="+mn-cs"/>
+              </a:rPr>
+              <a:t>AddConstraint</a:t>
+            </a:r>
+            <a:r>
+              <a:rPr lang="en-US" altLang="zh-CN" sz="1200" kern="1200" dirty="0" smtClean="0">
+                <a:solidFill>
+                  <a:schemeClr val="tx1"/>
+                </a:solidFill>
+                <a:effectLst/>
+                <a:latin typeface="+mn-lt"/>
+                <a:ea typeface="+mn-ea"/>
+                <a:cs typeface="+mn-cs"/>
+              </a:rPr>
+              <a:t>(solver-&gt;</a:t>
+            </a:r>
+            <a:r>
+              <a:rPr lang="en-US" altLang="zh-CN" sz="1200" kern="1200" dirty="0" err="1" smtClean="0">
+                <a:solidFill>
+                  <a:schemeClr val="tx1"/>
+                </a:solidFill>
+                <a:effectLst/>
+                <a:latin typeface="+mn-lt"/>
+                <a:ea typeface="+mn-ea"/>
+                <a:cs typeface="+mn-cs"/>
+              </a:rPr>
+              <a:t>MakeEquality</a:t>
+            </a:r>
+            <a:r>
+              <a:rPr lang="en-US" altLang="zh-CN" sz="1200" kern="1200" dirty="0" smtClean="0">
+                <a:solidFill>
+                  <a:schemeClr val="tx1"/>
+                </a:solidFill>
+                <a:effectLst/>
+                <a:latin typeface="+mn-lt"/>
+                <a:ea typeface="+mn-ea"/>
+                <a:cs typeface="+mn-cs"/>
+              </a:rPr>
+              <a:t>( // </a:t>
+            </a:r>
+            <a:r>
+              <a:rPr lang="en-US" altLang="zh-CN" sz="1200" kern="1200" dirty="0" err="1" smtClean="0">
+                <a:solidFill>
+                  <a:schemeClr val="tx1"/>
+                </a:solidFill>
+                <a:effectLst/>
+                <a:latin typeface="+mn-lt"/>
+                <a:ea typeface="+mn-ea"/>
+                <a:cs typeface="+mn-cs"/>
+              </a:rPr>
+              <a:t>routing.VehicleVar</a:t>
+            </a:r>
+            <a:r>
+              <a:rPr lang="en-US" altLang="zh-CN" sz="1200" kern="1200" dirty="0" smtClean="0">
+                <a:solidFill>
+                  <a:schemeClr val="tx1"/>
+                </a:solidFill>
+                <a:effectLst/>
+                <a:latin typeface="+mn-lt"/>
+                <a:ea typeface="+mn-ea"/>
+                <a:cs typeface="+mn-cs"/>
+              </a:rPr>
+              <a:t>(</a:t>
+            </a:r>
+            <a:r>
+              <a:rPr lang="en-US" altLang="zh-CN" sz="1200" kern="1200" dirty="0" err="1" smtClean="0">
+                <a:solidFill>
+                  <a:schemeClr val="tx1"/>
+                </a:solidFill>
+                <a:effectLst/>
+                <a:latin typeface="+mn-lt"/>
+                <a:ea typeface="+mn-ea"/>
+                <a:cs typeface="+mn-cs"/>
+              </a:rPr>
+              <a:t>routing.NodeToIndex</a:t>
+            </a:r>
+            <a:r>
+              <a:rPr lang="en-US" altLang="zh-CN" sz="1200" kern="1200" dirty="0" smtClean="0">
+                <a:solidFill>
+                  <a:schemeClr val="tx1"/>
+                </a:solidFill>
+                <a:effectLst/>
+                <a:latin typeface="+mn-lt"/>
+                <a:ea typeface="+mn-ea"/>
+                <a:cs typeface="+mn-cs"/>
+              </a:rPr>
+              <a:t>(node1)), // </a:t>
+            </a:r>
+            <a:r>
+              <a:rPr lang="en-US" altLang="zh-CN" sz="1200" kern="1200" dirty="0" err="1" smtClean="0">
+                <a:solidFill>
+                  <a:schemeClr val="tx1"/>
+                </a:solidFill>
+                <a:effectLst/>
+                <a:latin typeface="+mn-lt"/>
+                <a:ea typeface="+mn-ea"/>
+                <a:cs typeface="+mn-cs"/>
+              </a:rPr>
+              <a:t>routing.VehicleVar</a:t>
+            </a:r>
+            <a:r>
+              <a:rPr lang="en-US" altLang="zh-CN" sz="1200" kern="1200" dirty="0" smtClean="0">
+                <a:solidFill>
+                  <a:schemeClr val="tx1"/>
+                </a:solidFill>
+                <a:effectLst/>
+                <a:latin typeface="+mn-lt"/>
+                <a:ea typeface="+mn-ea"/>
+                <a:cs typeface="+mn-cs"/>
+              </a:rPr>
+              <a:t>(</a:t>
+            </a:r>
+            <a:r>
+              <a:rPr lang="en-US" altLang="zh-CN" sz="1200" kern="1200" dirty="0" err="1" smtClean="0">
+                <a:solidFill>
+                  <a:schemeClr val="tx1"/>
+                </a:solidFill>
+                <a:effectLst/>
+                <a:latin typeface="+mn-lt"/>
+                <a:ea typeface="+mn-ea"/>
+                <a:cs typeface="+mn-cs"/>
+              </a:rPr>
+              <a:t>routing.NodeToIndex</a:t>
+            </a:r>
+            <a:r>
+              <a:rPr lang="en-US" altLang="zh-CN" sz="1200" kern="1200" dirty="0" smtClean="0">
+                <a:solidFill>
+                  <a:schemeClr val="tx1"/>
+                </a:solidFill>
+                <a:effectLst/>
+                <a:latin typeface="+mn-lt"/>
+                <a:ea typeface="+mn-ea"/>
+                <a:cs typeface="+mn-cs"/>
+              </a:rPr>
+              <a:t>(node2)))); // solver-&gt;</a:t>
+            </a:r>
+            <a:r>
+              <a:rPr lang="en-US" altLang="zh-CN" sz="1200" kern="1200" dirty="0" err="1" smtClean="0">
+                <a:solidFill>
+                  <a:schemeClr val="tx1"/>
+                </a:solidFill>
+                <a:effectLst/>
+                <a:latin typeface="+mn-lt"/>
+                <a:ea typeface="+mn-ea"/>
+                <a:cs typeface="+mn-cs"/>
+              </a:rPr>
+              <a:t>AddPickupAndDelivery</a:t>
+            </a:r>
+            <a:r>
+              <a:rPr lang="en-US" altLang="zh-CN" sz="1200" kern="1200" dirty="0" smtClean="0">
+                <a:solidFill>
+                  <a:schemeClr val="tx1"/>
+                </a:solidFill>
+                <a:effectLst/>
+                <a:latin typeface="+mn-lt"/>
+                <a:ea typeface="+mn-ea"/>
+                <a:cs typeface="+mn-cs"/>
+              </a:rPr>
+              <a:t>(node1, node2); // // TODO(user): Remove this when model introspection detects linked nodes. void </a:t>
+            </a:r>
+            <a:r>
+              <a:rPr lang="en-US" altLang="zh-CN" sz="1200" kern="1200" dirty="0" err="1" smtClean="0">
+                <a:solidFill>
+                  <a:schemeClr val="tx1"/>
+                </a:solidFill>
+                <a:effectLst/>
+                <a:latin typeface="+mn-lt"/>
+                <a:ea typeface="+mn-ea"/>
+                <a:cs typeface="+mn-cs"/>
+              </a:rPr>
+              <a:t>AddPickupAndDelivery</a:t>
+            </a:r>
+            <a:r>
+              <a:rPr lang="en-US" altLang="zh-CN" sz="1200" kern="1200" dirty="0" smtClean="0">
+                <a:solidFill>
+                  <a:schemeClr val="tx1"/>
+                </a:solidFill>
+                <a:effectLst/>
+                <a:latin typeface="+mn-lt"/>
+                <a:ea typeface="+mn-ea"/>
+                <a:cs typeface="+mn-cs"/>
+              </a:rPr>
+              <a:t>(</a:t>
+            </a:r>
+            <a:r>
+              <a:rPr lang="en-US" altLang="zh-CN" sz="1200" kern="1200" dirty="0" err="1" smtClean="0">
+                <a:solidFill>
+                  <a:schemeClr val="tx1"/>
+                </a:solidFill>
+                <a:effectLst/>
+                <a:latin typeface="+mn-lt"/>
+                <a:ea typeface="+mn-ea"/>
+                <a:cs typeface="+mn-cs"/>
+              </a:rPr>
+              <a:t>NodeIndex</a:t>
+            </a:r>
+            <a:r>
+              <a:rPr lang="en-US" altLang="zh-CN" sz="1200" kern="1200" dirty="0" smtClean="0">
+                <a:solidFill>
+                  <a:schemeClr val="tx1"/>
+                </a:solidFill>
+                <a:effectLst/>
+                <a:latin typeface="+mn-lt"/>
+                <a:ea typeface="+mn-ea"/>
+                <a:cs typeface="+mn-cs"/>
+              </a:rPr>
+              <a:t> node1, </a:t>
+            </a:r>
+            <a:r>
+              <a:rPr lang="en-US" altLang="zh-CN" sz="1200" kern="1200" dirty="0" err="1" smtClean="0">
+                <a:solidFill>
+                  <a:schemeClr val="tx1"/>
+                </a:solidFill>
+                <a:effectLst/>
+                <a:latin typeface="+mn-lt"/>
+                <a:ea typeface="+mn-ea"/>
+                <a:cs typeface="+mn-cs"/>
+              </a:rPr>
+              <a:t>NodeIndex</a:t>
+            </a:r>
+            <a:r>
+              <a:rPr lang="en-US" altLang="zh-CN" sz="1200" kern="1200" dirty="0" smtClean="0">
+                <a:solidFill>
+                  <a:schemeClr val="tx1"/>
+                </a:solidFill>
+                <a:effectLst/>
+                <a:latin typeface="+mn-lt"/>
+                <a:ea typeface="+mn-ea"/>
+                <a:cs typeface="+mn-cs"/>
+              </a:rPr>
+              <a:t> node2) { pickup_delivery_pairs_.</a:t>
+            </a:r>
+            <a:r>
+              <a:rPr lang="en-US" altLang="zh-CN" sz="1200" kern="1200" dirty="0" err="1" smtClean="0">
+                <a:solidFill>
+                  <a:schemeClr val="tx1"/>
+                </a:solidFill>
+                <a:effectLst/>
+                <a:latin typeface="+mn-lt"/>
+                <a:ea typeface="+mn-ea"/>
+                <a:cs typeface="+mn-cs"/>
+              </a:rPr>
+              <a:t>push_back</a:t>
+            </a:r>
+            <a:r>
+              <a:rPr lang="en-US" altLang="zh-CN" sz="1200" kern="1200" dirty="0" smtClean="0">
+                <a:solidFill>
+                  <a:schemeClr val="tx1"/>
+                </a:solidFill>
+                <a:effectLst/>
+                <a:latin typeface="+mn-lt"/>
+                <a:ea typeface="+mn-ea"/>
+                <a:cs typeface="+mn-cs"/>
+              </a:rPr>
+              <a:t>( {{</a:t>
+            </a:r>
+            <a:r>
+              <a:rPr lang="en-US" altLang="zh-CN" sz="1200" kern="1200" dirty="0" err="1" smtClean="0">
+                <a:solidFill>
+                  <a:schemeClr val="tx1"/>
+                </a:solidFill>
+                <a:effectLst/>
+                <a:latin typeface="+mn-lt"/>
+                <a:ea typeface="+mn-ea"/>
+                <a:cs typeface="+mn-cs"/>
+              </a:rPr>
+              <a:t>NodeToIndex</a:t>
+            </a:r>
+            <a:r>
+              <a:rPr lang="en-US" altLang="zh-CN" sz="1200" kern="1200" dirty="0" smtClean="0">
+                <a:solidFill>
+                  <a:schemeClr val="tx1"/>
+                </a:solidFill>
+                <a:effectLst/>
+                <a:latin typeface="+mn-lt"/>
+                <a:ea typeface="+mn-ea"/>
+                <a:cs typeface="+mn-cs"/>
+              </a:rPr>
+              <a:t>(node1)}, {</a:t>
+            </a:r>
+            <a:r>
+              <a:rPr lang="en-US" altLang="zh-CN" sz="1200" kern="1200" dirty="0" err="1" smtClean="0">
+                <a:solidFill>
+                  <a:schemeClr val="tx1"/>
+                </a:solidFill>
+                <a:effectLst/>
+                <a:latin typeface="+mn-lt"/>
+                <a:ea typeface="+mn-ea"/>
+                <a:cs typeface="+mn-cs"/>
+              </a:rPr>
+              <a:t>NodeToIndex</a:t>
+            </a:r>
+            <a:r>
+              <a:rPr lang="en-US" altLang="zh-CN" sz="1200" kern="1200" dirty="0" smtClean="0">
+                <a:solidFill>
+                  <a:schemeClr val="tx1"/>
+                </a:solidFill>
+                <a:effectLst/>
+                <a:latin typeface="+mn-lt"/>
+                <a:ea typeface="+mn-ea"/>
+                <a:cs typeface="+mn-cs"/>
+              </a:rPr>
+              <a:t>(node2)}}); }</a:t>
+            </a:r>
+            <a:endParaRPr lang="zh-CN" altLang="en-US" dirty="0"/>
+          </a:p>
+        </p:txBody>
+      </p:sp>
+      <p:sp>
+        <p:nvSpPr>
+          <p:cNvPr id="4" name="灯片编号占位符 3"/>
+          <p:cNvSpPr>
+            <a:spLocks noGrp="1"/>
+          </p:cNvSpPr>
+          <p:nvPr>
+            <p:ph type="sldNum" sz="quarter" idx="10"/>
+          </p:nvPr>
+        </p:nvSpPr>
+        <p:spPr/>
+        <p:txBody>
+          <a:bodyPr/>
+          <a:lstStyle/>
+          <a:p>
+            <a:fld id="{89805CDA-6A0C-4198-AA2F-A0A1AE35D034}" type="slidenum">
+              <a:rPr lang="zh-CN" altLang="en-US" smtClean="0"/>
+              <a:t>25</a:t>
+            </a:fld>
+            <a:endParaRPr lang="zh-CN" altLang="en-US"/>
+          </a:p>
+        </p:txBody>
+      </p:sp>
+    </p:spTree>
+    <p:extLst>
+      <p:ext uri="{BB962C8B-B14F-4D97-AF65-F5344CB8AC3E}">
+        <p14:creationId xmlns:p14="http://schemas.microsoft.com/office/powerpoint/2010/main" val="2732073608"/>
+      </p:ext>
+    </p:extLst>
+  </p:cSld>
+  <p:clrMapOvr>
+    <a:masterClrMapping/>
+  </p:clrMapOvr>
+</p:notes>
+</file>
+
+<file path=ppt/notesSlides/notesSlide15.xml><?xml version="1.0" encoding="utf-8"?>
+<p:notes xmlns:a="http://schemas.openxmlformats.org/drawingml/2006/main" xmlns:r="http://schemas.openxmlformats.org/officeDocument/2006/relationships" xmlns:p="http://schemas.openxmlformats.org/presentationml/2006/main">
+  <p:cSld>
+    <p:spTree>
+      <p:nvGrpSpPr>
+        <p:cNvPr id="1" name=""/>
+        <p:cNvGrpSpPr/>
+        <p:nvPr/>
+      </p:nvGrpSpPr>
+      <p:grpSpPr>
+        <a:xfrm>
+          <a:off x="0" y="0"/>
+          <a:ext cx="0" cy="0"/>
+          <a:chOff x="0" y="0"/>
+          <a:chExt cx="0" cy="0"/>
+        </a:xfrm>
+      </p:grpSpPr>
+      <p:sp>
+        <p:nvSpPr>
+          <p:cNvPr id="2" name="幻灯片图像占位符 1"/>
+          <p:cNvSpPr>
+            <a:spLocks noGrp="1" noRot="1" noChangeAspect="1"/>
+          </p:cNvSpPr>
+          <p:nvPr>
+            <p:ph type="sldImg"/>
+          </p:nvPr>
+        </p:nvSpPr>
+        <p:spPr/>
+      </p:sp>
+      <p:sp>
+        <p:nvSpPr>
+          <p:cNvPr id="3" name="备注占位符 2"/>
+          <p:cNvSpPr>
+            <a:spLocks noGrp="1"/>
+          </p:cNvSpPr>
+          <p:nvPr>
+            <p:ph type="body" idx="1"/>
+          </p:nvPr>
+        </p:nvSpPr>
+        <p:spPr/>
+        <p:txBody>
+          <a:bodyPr/>
+          <a:lstStyle/>
+          <a:p>
+            <a:r>
+              <a:rPr lang="en-US" altLang="zh-CN" dirty="0" smtClean="0"/>
+              <a:t>https://github.com/google/or-tools/blob/master/src/constraint_solver/constraint_solver.h line 1200+-</a:t>
+            </a:r>
+            <a:endParaRPr lang="zh-CN" altLang="en-US" dirty="0"/>
+          </a:p>
+        </p:txBody>
+      </p:sp>
+      <p:sp>
+        <p:nvSpPr>
+          <p:cNvPr id="4" name="灯片编号占位符 3"/>
+          <p:cNvSpPr>
+            <a:spLocks noGrp="1"/>
+          </p:cNvSpPr>
+          <p:nvPr>
+            <p:ph type="sldNum" sz="quarter" idx="10"/>
+          </p:nvPr>
+        </p:nvSpPr>
+        <p:spPr/>
+        <p:txBody>
+          <a:bodyPr/>
+          <a:lstStyle/>
+          <a:p>
+            <a:fld id="{89805CDA-6A0C-4198-AA2F-A0A1AE35D034}" type="slidenum">
+              <a:rPr lang="zh-CN" altLang="en-US" smtClean="0"/>
+              <a:t>26</a:t>
+            </a:fld>
+            <a:endParaRPr lang="zh-CN" altLang="en-US"/>
+          </a:p>
+        </p:txBody>
+      </p:sp>
+    </p:spTree>
+    <p:extLst>
+      <p:ext uri="{BB962C8B-B14F-4D97-AF65-F5344CB8AC3E}">
+        <p14:creationId xmlns:p14="http://schemas.microsoft.com/office/powerpoint/2010/main" val="2600836712"/>
+      </p:ext>
+    </p:extLst>
+  </p:cSld>
+  <p:clrMapOvr>
+    <a:masterClrMapping/>
+  </p:clrMapOvr>
+</p:notes>
+</file>
+
+<file path=ppt/notesSlides/notesSlide16.xml><?xml version="1.0" encoding="utf-8"?>
+<p:notes xmlns:a="http://schemas.openxmlformats.org/drawingml/2006/main" xmlns:r="http://schemas.openxmlformats.org/officeDocument/2006/relationships" xmlns:p="http://schemas.openxmlformats.org/presentationml/2006/main">
+  <p:cSld>
+    <p:spTree>
+      <p:nvGrpSpPr>
+        <p:cNvPr id="1" name=""/>
+        <p:cNvGrpSpPr/>
+        <p:nvPr/>
+      </p:nvGrpSpPr>
+      <p:grpSpPr>
+        <a:xfrm>
+          <a:off x="0" y="0"/>
+          <a:ext cx="0" cy="0"/>
+          <a:chOff x="0" y="0"/>
+          <a:chExt cx="0" cy="0"/>
+        </a:xfrm>
+      </p:grpSpPr>
+      <p:sp>
+        <p:nvSpPr>
+          <p:cNvPr id="2" name="幻灯片图像占位符 1"/>
+          <p:cNvSpPr>
+            <a:spLocks noGrp="1" noRot="1" noChangeAspect="1"/>
+          </p:cNvSpPr>
+          <p:nvPr>
+            <p:ph type="sldImg"/>
+          </p:nvPr>
+        </p:nvSpPr>
+        <p:spPr/>
+      </p:sp>
+      <p:sp>
+        <p:nvSpPr>
+          <p:cNvPr id="3" name="备注占位符 2"/>
+          <p:cNvSpPr>
+            <a:spLocks noGrp="1"/>
+          </p:cNvSpPr>
+          <p:nvPr>
+            <p:ph type="body" idx="1"/>
+          </p:nvPr>
+        </p:nvSpPr>
+        <p:spPr/>
+        <p:txBody>
+          <a:bodyPr/>
+          <a:lstStyle/>
+          <a:p>
+            <a:r>
+              <a:rPr lang="en-US" altLang="zh-CN" dirty="0" smtClean="0"/>
+              <a:t>https://github.com/google/or-tools/blob/master/src/constraint_solver/constraint_solver.h line 1200+-</a:t>
+            </a:r>
+            <a:endParaRPr lang="zh-CN" altLang="en-US" dirty="0"/>
+          </a:p>
+        </p:txBody>
+      </p:sp>
+      <p:sp>
+        <p:nvSpPr>
+          <p:cNvPr id="4" name="灯片编号占位符 3"/>
+          <p:cNvSpPr>
+            <a:spLocks noGrp="1"/>
+          </p:cNvSpPr>
+          <p:nvPr>
+            <p:ph type="sldNum" sz="quarter" idx="10"/>
+          </p:nvPr>
+        </p:nvSpPr>
+        <p:spPr/>
+        <p:txBody>
+          <a:bodyPr/>
+          <a:lstStyle/>
+          <a:p>
+            <a:fld id="{89805CDA-6A0C-4198-AA2F-A0A1AE35D034}" type="slidenum">
+              <a:rPr lang="zh-CN" altLang="en-US" smtClean="0"/>
+              <a:t>27</a:t>
+            </a:fld>
+            <a:endParaRPr lang="zh-CN" altLang="en-US"/>
+          </a:p>
+        </p:txBody>
+      </p:sp>
+    </p:spTree>
+    <p:extLst>
+      <p:ext uri="{BB962C8B-B14F-4D97-AF65-F5344CB8AC3E}">
+        <p14:creationId xmlns:p14="http://schemas.microsoft.com/office/powerpoint/2010/main" val="1372726487"/>
+      </p:ext>
+    </p:extLst>
+  </p:cSld>
+  <p:clrMapOvr>
+    <a:masterClrMapping/>
+  </p:clrMapOvr>
+</p:notes>
+</file>
+
 <file path=ppt/notesSlides/notesSlide2.xml><?xml version="1.0" encoding="utf-8"?>
 <p:notes xmlns:a="http://schemas.openxmlformats.org/drawingml/2006/main" xmlns:r="http://schemas.openxmlformats.org/officeDocument/2006/relationships" xmlns:p="http://schemas.openxmlformats.org/presentationml/2006/main">
   <p:cSld>
@@ -3465,7 +4235,7 @@
           <a:p>
             <a:fld id="{50304CC2-2025-4634-B870-34FFEAAFB94C}" type="datetimeFigureOut">
               <a:rPr lang="zh-CN" altLang="en-US" smtClean="0"/>
-              <a:t>2017/3/10</a:t>
+              <a:t>2017/3/16</a:t>
             </a:fld>
             <a:endParaRPr lang="zh-CN" altLang="en-US"/>
           </a:p>
@@ -3635,7 +4405,7 @@
           <a:p>
             <a:fld id="{50304CC2-2025-4634-B870-34FFEAAFB94C}" type="datetimeFigureOut">
               <a:rPr lang="zh-CN" altLang="en-US" smtClean="0"/>
-              <a:t>2017/3/10</a:t>
+              <a:t>2017/3/16</a:t>
             </a:fld>
             <a:endParaRPr lang="zh-CN" altLang="en-US"/>
           </a:p>
@@ -3815,7 +4585,7 @@
           <a:p>
             <a:fld id="{50304CC2-2025-4634-B870-34FFEAAFB94C}" type="datetimeFigureOut">
               <a:rPr lang="zh-CN" altLang="en-US" smtClean="0"/>
-              <a:t>2017/3/10</a:t>
+              <a:t>2017/3/16</a:t>
             </a:fld>
             <a:endParaRPr lang="zh-CN" altLang="en-US"/>
           </a:p>
@@ -4001,7 +4771,7 @@
           <a:p>
             <a:fld id="{50304CC2-2025-4634-B870-34FFEAAFB94C}" type="datetimeFigureOut">
               <a:rPr lang="zh-CN" altLang="en-US" smtClean="0"/>
-              <a:t>2017/3/10</a:t>
+              <a:t>2017/3/16</a:t>
             </a:fld>
             <a:endParaRPr lang="zh-CN" altLang="en-US"/>
           </a:p>
@@ -4252,7 +5022,7 @@
           <a:p>
             <a:fld id="{50304CC2-2025-4634-B870-34FFEAAFB94C}" type="datetimeFigureOut">
               <a:rPr lang="zh-CN" altLang="en-US" smtClean="0"/>
-              <a:t>2017/3/10</a:t>
+              <a:t>2017/3/16</a:t>
             </a:fld>
             <a:endParaRPr lang="zh-CN" altLang="en-US"/>
           </a:p>
@@ -4491,7 +5261,7 @@
           <a:p>
             <a:fld id="{50304CC2-2025-4634-B870-34FFEAAFB94C}" type="datetimeFigureOut">
               <a:rPr lang="zh-CN" altLang="en-US" smtClean="0"/>
-              <a:t>2017/3/10</a:t>
+              <a:t>2017/3/16</a:t>
             </a:fld>
             <a:endParaRPr lang="zh-CN" altLang="en-US"/>
           </a:p>
@@ -4858,7 +5628,7 @@
           <a:p>
             <a:fld id="{50304CC2-2025-4634-B870-34FFEAAFB94C}" type="datetimeFigureOut">
               <a:rPr lang="zh-CN" altLang="en-US" smtClean="0"/>
-              <a:t>2017/3/10</a:t>
+              <a:t>2017/3/16</a:t>
             </a:fld>
             <a:endParaRPr lang="zh-CN" altLang="en-US"/>
           </a:p>
@@ -4976,7 +5746,7 @@
           <a:p>
             <a:fld id="{50304CC2-2025-4634-B870-34FFEAAFB94C}" type="datetimeFigureOut">
               <a:rPr lang="zh-CN" altLang="en-US" smtClean="0"/>
-              <a:t>2017/3/10</a:t>
+              <a:t>2017/3/16</a:t>
             </a:fld>
             <a:endParaRPr lang="zh-CN" altLang="en-US"/>
           </a:p>
@@ -5071,7 +5841,7 @@
           <a:p>
             <a:fld id="{50304CC2-2025-4634-B870-34FFEAAFB94C}" type="datetimeFigureOut">
               <a:rPr lang="zh-CN" altLang="en-US" smtClean="0"/>
-              <a:t>2017/3/10</a:t>
+              <a:t>2017/3/16</a:t>
             </a:fld>
             <a:endParaRPr lang="zh-CN" altLang="en-US"/>
           </a:p>
@@ -5348,7 +6118,7 @@
           <a:p>
             <a:fld id="{50304CC2-2025-4634-B870-34FFEAAFB94C}" type="datetimeFigureOut">
               <a:rPr lang="zh-CN" altLang="en-US" smtClean="0"/>
-              <a:t>2017/3/10</a:t>
+              <a:t>2017/3/16</a:t>
             </a:fld>
             <a:endParaRPr lang="zh-CN" altLang="en-US"/>
           </a:p>
@@ -5605,7 +6375,7 @@
           <a:p>
             <a:fld id="{50304CC2-2025-4634-B870-34FFEAAFB94C}" type="datetimeFigureOut">
               <a:rPr lang="zh-CN" altLang="en-US" smtClean="0"/>
-              <a:t>2017/3/10</a:t>
+              <a:t>2017/3/16</a:t>
             </a:fld>
             <a:endParaRPr lang="zh-CN" altLang="en-US"/>
           </a:p>
@@ -5818,7 +6588,7 @@
           <a:p>
             <a:fld id="{50304CC2-2025-4634-B870-34FFEAAFB94C}" type="datetimeFigureOut">
               <a:rPr lang="zh-CN" altLang="en-US" smtClean="0"/>
-              <a:t>2017/3/10</a:t>
+              <a:t>2017/3/16</a:t>
             </a:fld>
             <a:endParaRPr lang="zh-CN" altLang="en-US"/>
           </a:p>
@@ -6463,10 +7233,6 @@
               <a:rPr lang="zh-CN" altLang="en-US" sz="2200" dirty="0"/>
               <a:t>）</a:t>
             </a:r>
-            <a:r>
-              <a:rPr lang="zh-CN" altLang="en-US" sz="2200" dirty="0"/>
-              <a:t/>
-            </a:r>
             <a:br>
               <a:rPr lang="zh-CN" altLang="en-US" sz="2200" dirty="0"/>
             </a:br>
@@ -7977,7 +8743,6 @@
               <a:rPr lang="zh-CN" altLang="en-US" b="1" dirty="0"/>
               <a:t>问题求解</a:t>
             </a:r>
-            <a:endParaRPr lang="zh-CN" altLang="en-US" b="1" dirty="0"/>
           </a:p>
         </p:txBody>
       </p:sp>
@@ -8084,11 +8849,7 @@
             </a:r>
             <a:r>
               <a:rPr lang="zh-CN" altLang="en-US" dirty="0" smtClean="0"/>
-              <a:t>问题的</a:t>
-            </a:r>
-            <a:r>
-              <a:rPr lang="zh-CN" altLang="en-US" dirty="0" smtClean="0"/>
-              <a:t>直接依赖在</a:t>
+              <a:t>问题的直接依赖在</a:t>
             </a:r>
             <a:endParaRPr lang="en-US" altLang="zh-CN" dirty="0"/>
           </a:p>
@@ -8125,11 +8886,7 @@
             </a:pPr>
             <a:r>
               <a:rPr lang="en-US" altLang="zh-CN" dirty="0" err="1" smtClean="0"/>
-              <a:t>c</a:t>
-            </a:r>
-            <a:r>
-              <a:rPr lang="en-US" altLang="zh-CN" dirty="0" err="1" smtClean="0"/>
-              <a:t>onstraint_solver</a:t>
+              <a:t>constraint_solver</a:t>
             </a:r>
             <a:endParaRPr lang="en-US" altLang="zh-CN" dirty="0" smtClean="0"/>
           </a:p>
@@ -8865,7 +9622,6 @@
               <a:rPr lang="zh-CN" altLang="en-US" dirty="0"/>
               <a:t>变量搜索相关</a:t>
             </a:r>
-            <a:endParaRPr lang="zh-CN" altLang="en-US" dirty="0"/>
           </a:p>
         </p:txBody>
       </p:sp>
@@ -10063,24 +10819,14 @@
               <a:tabLst/>
             </a:pPr>
             <a:r>
-              <a:rPr lang="en-US" altLang="zh-CN" sz="2400" dirty="0">
+              <a:rPr lang="en-US" altLang="zh-CN" sz="2400" dirty="0" smtClean="0">
                 <a:solidFill>
                   <a:srgbClr val="F5871F"/>
                 </a:solidFill>
                 <a:latin typeface="Consolas" panose="020B0609020204030204" pitchFamily="49" charset="0"/>
                 <a:cs typeface="Consolas" panose="020B0609020204030204" pitchFamily="49" charset="0"/>
               </a:rPr>
-              <a:t> </a:t>
-            </a:r>
-            <a:r>
-              <a:rPr lang="en-US" altLang="zh-CN" sz="2400" dirty="0" smtClean="0">
-                <a:solidFill>
-                  <a:srgbClr val="F5871F"/>
-                </a:solidFill>
-                <a:latin typeface="Consolas" panose="020B0609020204030204" pitchFamily="49" charset="0"/>
-                <a:cs typeface="Consolas" panose="020B0609020204030204" pitchFamily="49" charset="0"/>
-              </a:rPr>
-              <a:t>                </a:t>
+              <a:t>                 </a:t>
             </a:r>
             <a:r>
               <a:rPr kumimoji="0" lang="zh-CN" altLang="zh-CN" sz="2400" b="0" i="0" u="none" strike="noStrike" cap="none" normalizeH="0" baseline="0" dirty="0" smtClean="0">
@@ -10126,24 +10872,14 @@
               <a:tabLst/>
             </a:pPr>
             <a:r>
-              <a:rPr lang="en-US" altLang="zh-CN" sz="2400" dirty="0">
+              <a:rPr lang="en-US" altLang="zh-CN" sz="2400" dirty="0" smtClean="0">
                 <a:solidFill>
                   <a:srgbClr val="F5871F"/>
                 </a:solidFill>
                 <a:latin typeface="Consolas" panose="020B0609020204030204" pitchFamily="49" charset="0"/>
                 <a:cs typeface="Consolas" panose="020B0609020204030204" pitchFamily="49" charset="0"/>
               </a:rPr>
-              <a:t> </a:t>
-            </a:r>
-            <a:r>
-              <a:rPr lang="en-US" altLang="zh-CN" sz="2400" dirty="0" smtClean="0">
-                <a:solidFill>
-                  <a:srgbClr val="F5871F"/>
-                </a:solidFill>
-                <a:latin typeface="Consolas" panose="020B0609020204030204" pitchFamily="49" charset="0"/>
-                <a:cs typeface="Consolas" panose="020B0609020204030204" pitchFamily="49" charset="0"/>
-              </a:rPr>
-              <a:t>                 </a:t>
+              <a:t>                  </a:t>
             </a:r>
             <a:r>
               <a:rPr kumimoji="0" lang="zh-CN" altLang="zh-CN" sz="2400" b="0" i="0" u="none" strike="noStrike" cap="none" normalizeH="0" baseline="0" dirty="0" smtClean="0">
@@ -10260,24 +10996,14 @@
               <a:tabLst/>
             </a:pPr>
             <a:r>
-              <a:rPr lang="en-US" altLang="zh-CN" sz="2400" dirty="0">
+              <a:rPr lang="en-US" altLang="zh-CN" sz="2400" dirty="0" smtClean="0">
                 <a:solidFill>
                   <a:srgbClr val="4D4D4C"/>
                 </a:solidFill>
                 <a:latin typeface="Consolas" panose="020B0609020204030204" pitchFamily="49" charset="0"/>
                 <a:cs typeface="Consolas" panose="020B0609020204030204" pitchFamily="49" charset="0"/>
               </a:rPr>
-              <a:t> </a:t>
-            </a:r>
-            <a:r>
-              <a:rPr lang="en-US" altLang="zh-CN" sz="2400" dirty="0" smtClean="0">
-                <a:solidFill>
-                  <a:srgbClr val="4D4D4C"/>
-                </a:solidFill>
-                <a:latin typeface="Consolas" panose="020B0609020204030204" pitchFamily="49" charset="0"/>
-                <a:cs typeface="Consolas" panose="020B0609020204030204" pitchFamily="49" charset="0"/>
-              </a:rPr>
-              <a:t>                </a:t>
+              <a:t>                 </a:t>
             </a:r>
             <a:r>
               <a:rPr kumimoji="0" lang="zh-CN" altLang="zh-CN" sz="2400" b="0" i="0" u="none" strike="noStrike" cap="none" normalizeH="0" baseline="0" dirty="0" smtClean="0">
@@ -10407,24 +11133,14 @@
               <a:tabLst/>
             </a:pPr>
             <a:r>
-              <a:rPr lang="en-US" altLang="zh-CN" sz="2400" dirty="0">
+              <a:rPr lang="en-US" altLang="zh-CN" sz="2400" dirty="0" smtClean="0">
                 <a:solidFill>
                   <a:srgbClr val="4D4D4C"/>
                 </a:solidFill>
                 <a:latin typeface="Consolas" panose="020B0609020204030204" pitchFamily="49" charset="0"/>
                 <a:cs typeface="Consolas" panose="020B0609020204030204" pitchFamily="49" charset="0"/>
               </a:rPr>
-              <a:t> </a:t>
-            </a:r>
-            <a:r>
-              <a:rPr lang="en-US" altLang="zh-CN" sz="2400" dirty="0" smtClean="0">
-                <a:solidFill>
-                  <a:srgbClr val="4D4D4C"/>
-                </a:solidFill>
-                <a:latin typeface="Consolas" panose="020B0609020204030204" pitchFamily="49" charset="0"/>
-                <a:cs typeface="Consolas" panose="020B0609020204030204" pitchFamily="49" charset="0"/>
-              </a:rPr>
-              <a:t>                </a:t>
+              <a:t>                 </a:t>
             </a:r>
             <a:r>
               <a:rPr kumimoji="0" lang="zh-CN" altLang="zh-CN" sz="2400" b="0" i="0" u="none" strike="noStrike" cap="none" normalizeH="0" baseline="0" dirty="0" smtClean="0">
@@ -10506,14 +11222,14 @@
           <a:lstStyle/>
           <a:p>
             <a:r>
-              <a:rPr lang="en-US" altLang="zh-CN" b="1" dirty="0" smtClean="0"/>
-              <a:t>TSP</a:t>
-            </a:r>
-            <a:r>
-              <a:rPr lang="zh-CN" altLang="en-US" b="1" dirty="0" smtClean="0"/>
-              <a:t>问题示例</a:t>
-            </a:r>
-            <a:endParaRPr lang="zh-CN" altLang="en-US" b="1" dirty="0"/>
+              <a:rPr lang="zh-CN" altLang="en-US" dirty="0"/>
+              <a:t>关键</a:t>
+            </a:r>
+            <a:r>
+              <a:rPr lang="en-US" altLang="zh-CN" dirty="0"/>
+              <a:t>API</a:t>
+            </a:r>
+            <a:endParaRPr lang="zh-CN" altLang="en-US" dirty="0"/>
           </a:p>
         </p:txBody>
       </p:sp>
@@ -10527,80 +11243,144 @@
             <p:ph idx="1"/>
           </p:nvPr>
         </p:nvSpPr>
-        <p:spPr/>
-        <p:txBody>
-          <a:bodyPr/>
+        <p:spPr>
+          <a:xfrm>
+            <a:off x="628650" y="1256232"/>
+            <a:ext cx="7886700" cy="5048315"/>
+          </a:xfrm>
+        </p:spPr>
+        <p:txBody>
+          <a:bodyPr>
+            <a:normAutofit/>
+          </a:bodyPr>
           <a:lstStyle/>
           <a:p>
             <a:pPr>
               <a:lnSpc>
-                <a:spcPct val="200000"/>
+                <a:spcPct val="150000"/>
               </a:lnSpc>
             </a:pPr>
             <a:r>
-              <a:rPr lang="zh-CN" altLang="en-US" dirty="0" smtClean="0"/>
-              <a:t>准备数据</a:t>
-            </a:r>
-            <a:endParaRPr lang="en-US" altLang="zh-CN" dirty="0" smtClean="0"/>
+              <a:rPr lang="en-US" altLang="zh-CN" sz="2400" dirty="0" smtClean="0"/>
+              <a:t>VRP</a:t>
+            </a:r>
+            <a:r>
+              <a:rPr lang="zh-CN" altLang="en-US" sz="2400" dirty="0" smtClean="0"/>
+              <a:t>问题：加入若干节点属于同一辆车的约束：</a:t>
+            </a:r>
+            <a:endParaRPr lang="en-US" altLang="zh-CN" sz="2400" dirty="0" smtClean="0"/>
           </a:p>
           <a:p>
             <a:pPr>
               <a:lnSpc>
-                <a:spcPct val="200000"/>
+                <a:spcPct val="150000"/>
               </a:lnSpc>
             </a:pPr>
-            <a:r>
-              <a:rPr lang="zh-CN" altLang="en-US" dirty="0" smtClean="0"/>
-              <a:t>构造求解器</a:t>
-            </a:r>
-            <a:endParaRPr lang="en-US" altLang="zh-CN" dirty="0" smtClean="0"/>
+            <a:endParaRPr lang="en-US" altLang="zh-CN" sz="2400" dirty="0"/>
           </a:p>
           <a:p>
             <a:pPr>
               <a:lnSpc>
-                <a:spcPct val="200000"/>
+                <a:spcPct val="150000"/>
               </a:lnSpc>
             </a:pPr>
-            <a:r>
-              <a:rPr lang="zh-CN" altLang="en-US" dirty="0"/>
-              <a:t>准备</a:t>
-            </a:r>
-            <a:r>
-              <a:rPr lang="en-US" altLang="zh-CN" dirty="0"/>
-              <a:t>callback</a:t>
-            </a:r>
-            <a:r>
-              <a:rPr lang="zh-CN" altLang="en-US" dirty="0" smtClean="0"/>
-              <a:t>函数</a:t>
-            </a:r>
-            <a:endParaRPr lang="en-US" altLang="zh-CN" dirty="0" smtClean="0"/>
-          </a:p>
-          <a:p>
-            <a:pPr>
-              <a:lnSpc>
-                <a:spcPct val="200000"/>
-              </a:lnSpc>
-            </a:pPr>
-            <a:r>
-              <a:rPr lang="zh-CN" altLang="en-US" dirty="0"/>
-              <a:t>调用求解器</a:t>
-            </a:r>
+            <a:endParaRPr lang="en-US" altLang="zh-CN" sz="2400" dirty="0" smtClean="0"/>
           </a:p>
           <a:p>
             <a:pPr marL="0" indent="0">
               <a:lnSpc>
-                <a:spcPct val="200000"/>
+                <a:spcPct val="150000"/>
               </a:lnSpc>
               <a:buNone/>
             </a:pPr>
-            <a:endParaRPr lang="zh-CN" altLang="en-US" dirty="0"/>
-          </a:p>
-        </p:txBody>
-      </p:sp>
+            <a:r>
+              <a:rPr lang="zh-CN" altLang="en-US" sz="2400" dirty="0" smtClean="0"/>
+              <a:t>示例：</a:t>
+            </a:r>
+            <a:r>
+              <a:rPr lang="en-US" altLang="zh-CN" sz="2400" dirty="0" smtClean="0"/>
+              <a:t>solver-&gt;</a:t>
+            </a:r>
+            <a:r>
+              <a:rPr lang="en-US" altLang="zh-CN" sz="2400" dirty="0" err="1" smtClean="0"/>
+              <a:t>AddSoftSameVehicleConstraint</a:t>
+            </a:r>
+            <a:r>
+              <a:rPr lang="en-US" altLang="zh-CN" sz="2400" dirty="0" smtClean="0"/>
+              <a:t>();</a:t>
+            </a:r>
+          </a:p>
+          <a:p>
+            <a:pPr marL="0" indent="0">
+              <a:lnSpc>
+                <a:spcPct val="150000"/>
+              </a:lnSpc>
+              <a:buNone/>
+            </a:pPr>
+            <a:r>
+              <a:rPr lang="zh-CN" altLang="en-US" sz="2400" dirty="0" smtClean="0"/>
+              <a:t>标注数组中的节点应该分到同一辆车上，如果没在同一辆车上，每多一个特例，总成本</a:t>
+            </a:r>
+            <a:r>
+              <a:rPr lang="zh-CN" altLang="en-US" sz="2400" dirty="0"/>
+              <a:t>函数</a:t>
+            </a:r>
+            <a:r>
+              <a:rPr lang="zh-CN" altLang="en-US" sz="2400" dirty="0" smtClean="0"/>
+              <a:t>增加</a:t>
+            </a:r>
+            <a:r>
+              <a:rPr lang="en-US" altLang="zh-CN" sz="2400" dirty="0" smtClean="0"/>
+              <a:t>cost.</a:t>
+            </a:r>
+          </a:p>
+          <a:p>
+            <a:pPr marL="0" indent="0">
+              <a:lnSpc>
+                <a:spcPct val="150000"/>
+              </a:lnSpc>
+              <a:buNone/>
+            </a:pPr>
+            <a:endParaRPr lang="en-US" altLang="zh-CN" sz="2400" dirty="0" smtClean="0"/>
+          </a:p>
+          <a:p>
+            <a:pPr marL="0" indent="0">
+              <a:lnSpc>
+                <a:spcPct val="150000"/>
+              </a:lnSpc>
+              <a:buNone/>
+            </a:pPr>
+            <a:endParaRPr lang="en-US" altLang="zh-CN" sz="2400" dirty="0" smtClean="0"/>
+          </a:p>
+        </p:txBody>
+      </p:sp>
+      <p:pic>
+        <p:nvPicPr>
+          <p:cNvPr id="7" name="图片 6"/>
+          <p:cNvPicPr>
+            <a:picLocks noChangeAspect="1"/>
+          </p:cNvPicPr>
+          <p:nvPr/>
+        </p:nvPicPr>
+        <p:blipFill rotWithShape="1">
+          <a:blip r:embed="rId3"/>
+          <a:srcRect r="4798"/>
+          <a:stretch/>
+        </p:blipFill>
+        <p:spPr>
+          <a:xfrm>
+            <a:off x="211015" y="2229654"/>
+            <a:ext cx="8932985" cy="923539"/>
+          </a:xfrm>
+          <a:prstGeom prst="rect">
+            <a:avLst/>
+          </a:prstGeom>
+        </p:spPr>
+      </p:pic>
     </p:spTree>
     <p:extLst>
       <p:ext uri="{BB962C8B-B14F-4D97-AF65-F5344CB8AC3E}">
-        <p14:creationId xmlns:p14="http://schemas.microsoft.com/office/powerpoint/2010/main" val="100844049"/>
+        <p14:creationId xmlns:p14="http://schemas.microsoft.com/office/powerpoint/2010/main" val="3807781890"/>
       </p:ext>
     </p:extLst>
   </p:cSld>
@@ -10650,6 +11430,660 @@
           <a:lstStyle/>
           <a:p>
             <a:r>
+              <a:rPr lang="zh-CN" altLang="en-US" dirty="0"/>
+              <a:t>关键</a:t>
+            </a:r>
+            <a:r>
+              <a:rPr lang="en-US" altLang="zh-CN" dirty="0"/>
+              <a:t>API</a:t>
+            </a:r>
+            <a:endParaRPr lang="zh-CN" altLang="en-US" dirty="0"/>
+          </a:p>
+        </p:txBody>
+      </p:sp>
+      <p:sp>
+        <p:nvSpPr>
+          <p:cNvPr id="3" name="内容占位符 2"/>
+          <p:cNvSpPr>
+            <a:spLocks noGrp="1"/>
+          </p:cNvSpPr>
+          <p:nvPr>
+            <p:ph idx="1"/>
+          </p:nvPr>
+        </p:nvSpPr>
+        <p:spPr>
+          <a:xfrm>
+            <a:off x="628650" y="1119499"/>
+            <a:ext cx="7886700" cy="5048315"/>
+          </a:xfrm>
+        </p:spPr>
+        <p:txBody>
+          <a:bodyPr>
+            <a:normAutofit/>
+          </a:bodyPr>
+          <a:lstStyle/>
+          <a:p>
+            <a:pPr>
+              <a:lnSpc>
+                <a:spcPct val="100000"/>
+              </a:lnSpc>
+            </a:pPr>
+            <a:r>
+              <a:rPr lang="en-US" altLang="zh-CN" sz="2400" dirty="0" smtClean="0"/>
+              <a:t>VRP</a:t>
+            </a:r>
+            <a:r>
+              <a:rPr lang="zh-CN" altLang="en-US" sz="2400" dirty="0" smtClean="0"/>
+              <a:t>问题：加入两个节点存在接送关系：</a:t>
+            </a:r>
+            <a:endParaRPr lang="en-US" altLang="zh-CN" sz="2400" dirty="0" smtClean="0"/>
+          </a:p>
+          <a:p>
+            <a:pPr>
+              <a:lnSpc>
+                <a:spcPct val="100000"/>
+              </a:lnSpc>
+            </a:pPr>
+            <a:endParaRPr lang="en-US" altLang="zh-CN" sz="2400" dirty="0"/>
+          </a:p>
+          <a:p>
+            <a:pPr>
+              <a:lnSpc>
+                <a:spcPct val="100000"/>
+              </a:lnSpc>
+            </a:pPr>
+            <a:endParaRPr lang="en-US" altLang="zh-CN" sz="2400" dirty="0" smtClean="0"/>
+          </a:p>
+          <a:p>
+            <a:pPr>
+              <a:lnSpc>
+                <a:spcPct val="100000"/>
+              </a:lnSpc>
+            </a:pPr>
+            <a:endParaRPr lang="en-US" altLang="zh-CN" sz="2400" dirty="0"/>
+          </a:p>
+          <a:p>
+            <a:pPr>
+              <a:lnSpc>
+                <a:spcPct val="100000"/>
+              </a:lnSpc>
+            </a:pPr>
+            <a:endParaRPr lang="en-US" altLang="zh-CN" sz="2400" dirty="0" smtClean="0"/>
+          </a:p>
+          <a:p>
+            <a:pPr marL="0" indent="0">
+              <a:lnSpc>
+                <a:spcPct val="100000"/>
+              </a:lnSpc>
+              <a:buNone/>
+            </a:pPr>
+            <a:r>
+              <a:rPr lang="zh-CN" altLang="en-US" sz="2400" dirty="0" smtClean="0"/>
+              <a:t>满足：</a:t>
+            </a:r>
+            <a:r>
+              <a:rPr lang="en-US" altLang="zh-CN" sz="2400" dirty="0" smtClean="0"/>
+              <a:t>1. node1,node2</a:t>
+            </a:r>
+            <a:r>
+              <a:rPr lang="zh-CN" altLang="en-US" sz="2400" dirty="0" smtClean="0"/>
+              <a:t>由同一辆车服务；</a:t>
+            </a:r>
+            <a:endParaRPr lang="en-US" altLang="zh-CN" sz="2400" dirty="0" smtClean="0"/>
+          </a:p>
+          <a:p>
+            <a:pPr marL="0" indent="0">
+              <a:lnSpc>
+                <a:spcPct val="100000"/>
+              </a:lnSpc>
+              <a:buNone/>
+            </a:pPr>
+            <a:r>
+              <a:rPr lang="en-US" altLang="zh-CN" sz="2400" dirty="0"/>
+              <a:t> </a:t>
+            </a:r>
+            <a:r>
+              <a:rPr lang="en-US" altLang="zh-CN" sz="2400" dirty="0" smtClean="0"/>
+              <a:t>            2. node1</a:t>
+            </a:r>
+            <a:r>
+              <a:rPr lang="zh-CN" altLang="en-US" sz="2400" dirty="0" smtClean="0"/>
+              <a:t>在</a:t>
+            </a:r>
+            <a:r>
+              <a:rPr lang="en-US" altLang="zh-CN" sz="2400" dirty="0" smtClean="0"/>
+              <a:t>node2</a:t>
+            </a:r>
+            <a:r>
+              <a:rPr lang="zh-CN" altLang="en-US" sz="2400" dirty="0" smtClean="0"/>
+              <a:t>前被访问。</a:t>
+            </a:r>
+            <a:endParaRPr lang="en-US" altLang="zh-CN" sz="2400" dirty="0" smtClean="0"/>
+          </a:p>
+          <a:p>
+            <a:pPr marL="0" indent="0">
+              <a:lnSpc>
+                <a:spcPct val="100000"/>
+              </a:lnSpc>
+              <a:buNone/>
+            </a:pPr>
+            <a:r>
+              <a:rPr lang="zh-CN" altLang="en-US" sz="2400" dirty="0" smtClean="0"/>
+              <a:t>示例</a:t>
+            </a:r>
+            <a:r>
+              <a:rPr lang="en-US" altLang="zh-CN" sz="2400" dirty="0" smtClean="0"/>
+              <a:t>:</a:t>
+            </a:r>
+          </a:p>
+          <a:p>
+            <a:pPr marL="0" indent="0">
+              <a:lnSpc>
+                <a:spcPct val="100000"/>
+              </a:lnSpc>
+              <a:buNone/>
+            </a:pPr>
+            <a:endParaRPr lang="en-US" altLang="zh-CN" sz="2400" dirty="0" smtClean="0"/>
+          </a:p>
+        </p:txBody>
+      </p:sp>
+      <p:pic>
+        <p:nvPicPr>
+          <p:cNvPr id="8" name="图片 7"/>
+          <p:cNvPicPr>
+            <a:picLocks noChangeAspect="1"/>
+          </p:cNvPicPr>
+          <p:nvPr/>
+        </p:nvPicPr>
+        <p:blipFill>
+          <a:blip r:embed="rId3"/>
+          <a:stretch>
+            <a:fillRect/>
+          </a:stretch>
+        </p:blipFill>
+        <p:spPr>
+          <a:xfrm>
+            <a:off x="507610" y="1643509"/>
+            <a:ext cx="8128780" cy="1602308"/>
+          </a:xfrm>
+          <a:prstGeom prst="rect">
+            <a:avLst/>
+          </a:prstGeom>
+        </p:spPr>
+      </p:pic>
+      <p:pic>
+        <p:nvPicPr>
+          <p:cNvPr id="4" name="图片 3"/>
+          <p:cNvPicPr>
+            <a:picLocks noChangeAspect="1"/>
+          </p:cNvPicPr>
+          <p:nvPr/>
+        </p:nvPicPr>
+        <p:blipFill>
+          <a:blip r:embed="rId4"/>
+          <a:stretch>
+            <a:fillRect/>
+          </a:stretch>
+        </p:blipFill>
+        <p:spPr>
+          <a:xfrm>
+            <a:off x="1484704" y="4617440"/>
+            <a:ext cx="7151686" cy="2074384"/>
+          </a:xfrm>
+          <a:prstGeom prst="rect">
+            <a:avLst/>
+          </a:prstGeom>
+        </p:spPr>
+      </p:pic>
+    </p:spTree>
+    <p:extLst>
+      <p:ext uri="{BB962C8B-B14F-4D97-AF65-F5344CB8AC3E}">
+        <p14:creationId xmlns:p14="http://schemas.microsoft.com/office/powerpoint/2010/main" val="2062970019"/>
+      </p:ext>
+    </p:extLst>
+  </p:cSld>
+  <p:clrMapOvr>
+    <a:masterClrMapping/>
+  </p:clrMapOvr>
+  <p:timing>
+    <p:tnLst>
+      <p:par>
+        <p:cTn id="1" dur="indefinite" restart="never" nodeType="tmRoot"/>
+      </p:par>
+    </p:tnLst>
+  </p:timing>
+</p:sld>
+</file>
+
+<file path=ppt/slides/slide26.xml><?xml version="1.0" encoding="utf-8"?>
+<p:sld xmlns:a="http://schemas.openxmlformats.org/drawingml/2006/main" xmlns:r="http://schemas.openxmlformats.org/officeDocument/2006/relationships" xmlns:p="http://schemas.openxmlformats.org/presentationml/2006/main">
+  <p:cSld>
+    <p:spTree>
+      <p:nvGrpSpPr>
+        <p:cNvPr id="1" name=""/>
+        <p:cNvGrpSpPr/>
+        <p:nvPr/>
+      </p:nvGrpSpPr>
+      <p:grpSpPr>
+        <a:xfrm>
+          <a:off x="0" y="0"/>
+          <a:ext cx="0" cy="0"/>
+          <a:chOff x="0" y="0"/>
+          <a:chExt cx="0" cy="0"/>
+        </a:xfrm>
+      </p:grpSpPr>
+      <p:sp>
+        <p:nvSpPr>
+          <p:cNvPr id="2" name="标题 1"/>
+          <p:cNvSpPr>
+            <a:spLocks noGrp="1"/>
+          </p:cNvSpPr>
+          <p:nvPr>
+            <p:ph type="title"/>
+          </p:nvPr>
+        </p:nvSpPr>
+        <p:spPr/>
+        <p:txBody>
+          <a:bodyPr/>
+          <a:lstStyle/>
+          <a:p>
+            <a:r>
+              <a:rPr lang="zh-CN" altLang="en-US" dirty="0"/>
+              <a:t>关键</a:t>
+            </a:r>
+            <a:r>
+              <a:rPr lang="en-US" altLang="zh-CN" dirty="0"/>
+              <a:t>API</a:t>
+            </a:r>
+            <a:endParaRPr lang="zh-CN" altLang="en-US" dirty="0"/>
+          </a:p>
+        </p:txBody>
+      </p:sp>
+      <p:sp>
+        <p:nvSpPr>
+          <p:cNvPr id="3" name="内容占位符 2"/>
+          <p:cNvSpPr>
+            <a:spLocks noGrp="1"/>
+          </p:cNvSpPr>
+          <p:nvPr>
+            <p:ph idx="1"/>
+          </p:nvPr>
+        </p:nvSpPr>
+        <p:spPr>
+          <a:xfrm>
+            <a:off x="628650" y="1119499"/>
+            <a:ext cx="7886700" cy="5048315"/>
+          </a:xfrm>
+        </p:spPr>
+        <p:txBody>
+          <a:bodyPr>
+            <a:normAutofit/>
+          </a:bodyPr>
+          <a:lstStyle/>
+          <a:p>
+            <a:pPr>
+              <a:lnSpc>
+                <a:spcPct val="100000"/>
+              </a:lnSpc>
+            </a:pPr>
+            <a:r>
+              <a:rPr lang="zh-CN" altLang="en-US" sz="2400" dirty="0" smtClean="0"/>
+              <a:t>自定义条件：在</a:t>
+            </a:r>
+            <a:r>
+              <a:rPr lang="en-US" altLang="zh-CN" sz="2400" dirty="0" err="1" smtClean="0"/>
+              <a:t>constraint_solver</a:t>
+            </a:r>
+            <a:r>
+              <a:rPr lang="zh-CN" altLang="en-US" sz="2400" dirty="0" smtClean="0"/>
+              <a:t>中加入</a:t>
+            </a:r>
+            <a:r>
+              <a:rPr lang="en-US" altLang="zh-CN" sz="2400" dirty="0" smtClean="0"/>
+              <a:t>constraint</a:t>
+            </a:r>
+          </a:p>
+          <a:p>
+            <a:pPr marL="0" indent="0">
+              <a:lnSpc>
+                <a:spcPct val="100000"/>
+              </a:lnSpc>
+              <a:buNone/>
+            </a:pPr>
+            <a:r>
+              <a:rPr lang="zh-CN" altLang="en-US" sz="2400" dirty="0" smtClean="0"/>
+              <a:t>示例：</a:t>
+            </a:r>
+            <a:endParaRPr lang="en-US" altLang="zh-CN" sz="2400" dirty="0" smtClean="0"/>
+          </a:p>
+          <a:p>
+            <a:pPr marL="0" indent="0">
+              <a:lnSpc>
+                <a:spcPct val="100000"/>
+              </a:lnSpc>
+              <a:buNone/>
+            </a:pPr>
+            <a:endParaRPr lang="en-US" altLang="zh-CN" sz="2400" dirty="0" smtClean="0"/>
+          </a:p>
+          <a:p>
+            <a:pPr marL="0" indent="0">
+              <a:lnSpc>
+                <a:spcPct val="100000"/>
+              </a:lnSpc>
+              <a:buNone/>
+            </a:pPr>
+            <a:endParaRPr lang="en-US" altLang="zh-CN" sz="2400" dirty="0"/>
+          </a:p>
+          <a:p>
+            <a:pPr marL="0" indent="0">
+              <a:lnSpc>
+                <a:spcPct val="100000"/>
+              </a:lnSpc>
+              <a:buNone/>
+            </a:pPr>
+            <a:r>
+              <a:rPr lang="zh-CN" altLang="en-US" sz="2400" dirty="0" smtClean="0"/>
+              <a:t>表示需要满足</a:t>
+            </a:r>
+            <a:r>
+              <a:rPr lang="en-US" altLang="zh-CN" sz="2400" dirty="0" smtClean="0"/>
+              <a:t>left &lt;= right.</a:t>
+            </a:r>
+          </a:p>
+          <a:p>
+            <a:pPr marL="0" indent="0">
+              <a:lnSpc>
+                <a:spcPct val="100000"/>
+              </a:lnSpc>
+              <a:buNone/>
+            </a:pPr>
+            <a:r>
+              <a:rPr lang="zh-CN" altLang="en-US" sz="2400" dirty="0" smtClean="0"/>
+              <a:t>还有很多这样的</a:t>
+            </a:r>
+            <a:r>
+              <a:rPr lang="en-US" altLang="zh-CN" sz="2400" dirty="0" smtClean="0"/>
+              <a:t>API</a:t>
+            </a:r>
+            <a:r>
+              <a:rPr lang="zh-CN" altLang="en-US" sz="2400" dirty="0" smtClean="0"/>
+              <a:t>：</a:t>
+            </a:r>
+            <a:endParaRPr lang="en-US" altLang="zh-CN" sz="2400" dirty="0" smtClean="0"/>
+          </a:p>
+          <a:p>
+            <a:pPr>
+              <a:lnSpc>
+                <a:spcPct val="100000"/>
+              </a:lnSpc>
+            </a:pPr>
+            <a:endParaRPr lang="en-US" altLang="zh-CN" sz="2400" dirty="0" smtClean="0"/>
+          </a:p>
+          <a:p>
+            <a:pPr>
+              <a:lnSpc>
+                <a:spcPct val="100000"/>
+              </a:lnSpc>
+            </a:pPr>
+            <a:endParaRPr lang="en-US" altLang="zh-CN" sz="2400" dirty="0" smtClean="0"/>
+          </a:p>
+          <a:p>
+            <a:pPr marL="0" indent="0">
+              <a:lnSpc>
+                <a:spcPct val="100000"/>
+              </a:lnSpc>
+              <a:buNone/>
+            </a:pPr>
+            <a:endParaRPr lang="en-US" altLang="zh-CN" sz="2400" dirty="0" smtClean="0"/>
+          </a:p>
+        </p:txBody>
+      </p:sp>
+      <p:pic>
+        <p:nvPicPr>
+          <p:cNvPr id="5" name="图片 4"/>
+          <p:cNvPicPr>
+            <a:picLocks noChangeAspect="1"/>
+          </p:cNvPicPr>
+          <p:nvPr/>
+        </p:nvPicPr>
+        <p:blipFill>
+          <a:blip r:embed="rId3"/>
+          <a:stretch>
+            <a:fillRect/>
+          </a:stretch>
+        </p:blipFill>
+        <p:spPr>
+          <a:xfrm>
+            <a:off x="179267" y="2243766"/>
+            <a:ext cx="8964733" cy="803855"/>
+          </a:xfrm>
+          <a:prstGeom prst="rect">
+            <a:avLst/>
+          </a:prstGeom>
+        </p:spPr>
+      </p:pic>
+      <p:pic>
+        <p:nvPicPr>
+          <p:cNvPr id="6" name="图片 5"/>
+          <p:cNvPicPr>
+            <a:picLocks noChangeAspect="1"/>
+          </p:cNvPicPr>
+          <p:nvPr/>
+        </p:nvPicPr>
+        <p:blipFill>
+          <a:blip r:embed="rId4"/>
+          <a:stretch>
+            <a:fillRect/>
+          </a:stretch>
+        </p:blipFill>
+        <p:spPr>
+          <a:xfrm>
+            <a:off x="1868608" y="4063330"/>
+            <a:ext cx="5429339" cy="2794670"/>
+          </a:xfrm>
+          <a:prstGeom prst="rect">
+            <a:avLst/>
+          </a:prstGeom>
+        </p:spPr>
+      </p:pic>
+    </p:spTree>
+    <p:extLst>
+      <p:ext uri="{BB962C8B-B14F-4D97-AF65-F5344CB8AC3E}">
+        <p14:creationId xmlns:p14="http://schemas.microsoft.com/office/powerpoint/2010/main" val="4068924399"/>
+      </p:ext>
+    </p:extLst>
+  </p:cSld>
+  <p:clrMapOvr>
+    <a:masterClrMapping/>
+  </p:clrMapOvr>
+  <p:timing>
+    <p:tnLst>
+      <p:par>
+        <p:cTn id="1" dur="indefinite" restart="never" nodeType="tmRoot"/>
+      </p:par>
+    </p:tnLst>
+  </p:timing>
+</p:sld>
+</file>
+
+<file path=ppt/slides/slide27.xml><?xml version="1.0" encoding="utf-8"?>
+<p:sld xmlns:a="http://schemas.openxmlformats.org/drawingml/2006/main" xmlns:r="http://schemas.openxmlformats.org/officeDocument/2006/relationships" xmlns:p="http://schemas.openxmlformats.org/presentationml/2006/main">
+  <p:cSld>
+    <p:spTree>
+      <p:nvGrpSpPr>
+        <p:cNvPr id="1" name=""/>
+        <p:cNvGrpSpPr/>
+        <p:nvPr/>
+      </p:nvGrpSpPr>
+      <p:grpSpPr>
+        <a:xfrm>
+          <a:off x="0" y="0"/>
+          <a:ext cx="0" cy="0"/>
+          <a:chOff x="0" y="0"/>
+          <a:chExt cx="0" cy="0"/>
+        </a:xfrm>
+      </p:grpSpPr>
+      <p:sp>
+        <p:nvSpPr>
+          <p:cNvPr id="2" name="标题 1"/>
+          <p:cNvSpPr>
+            <a:spLocks noGrp="1"/>
+          </p:cNvSpPr>
+          <p:nvPr>
+            <p:ph type="title"/>
+          </p:nvPr>
+        </p:nvSpPr>
+        <p:spPr/>
+        <p:txBody>
+          <a:bodyPr/>
+          <a:lstStyle/>
+          <a:p>
+            <a:r>
+              <a:rPr lang="zh-CN" altLang="en-US" dirty="0"/>
+              <a:t>关键</a:t>
+            </a:r>
+            <a:r>
+              <a:rPr lang="en-US" altLang="zh-CN" dirty="0"/>
+              <a:t>API</a:t>
+            </a:r>
+            <a:endParaRPr lang="zh-CN" altLang="en-US" dirty="0"/>
+          </a:p>
+        </p:txBody>
+      </p:sp>
+      <p:sp>
+        <p:nvSpPr>
+          <p:cNvPr id="3" name="内容占位符 2"/>
+          <p:cNvSpPr>
+            <a:spLocks noGrp="1"/>
+          </p:cNvSpPr>
+          <p:nvPr>
+            <p:ph idx="1"/>
+          </p:nvPr>
+        </p:nvSpPr>
+        <p:spPr>
+          <a:xfrm>
+            <a:off x="628650" y="1119499"/>
+            <a:ext cx="7886700" cy="5048315"/>
+          </a:xfrm>
+        </p:spPr>
+        <p:txBody>
+          <a:bodyPr>
+            <a:normAutofit/>
+          </a:bodyPr>
+          <a:lstStyle/>
+          <a:p>
+            <a:pPr>
+              <a:lnSpc>
+                <a:spcPct val="100000"/>
+              </a:lnSpc>
+            </a:pPr>
+            <a:r>
+              <a:rPr lang="zh-CN" altLang="en-US" sz="2400" dirty="0" smtClean="0"/>
+              <a:t>自定义条件</a:t>
+            </a:r>
+            <a:endParaRPr lang="en-US" altLang="zh-CN" sz="2400" dirty="0" smtClean="0"/>
+          </a:p>
+        </p:txBody>
+      </p:sp>
+      <p:pic>
+        <p:nvPicPr>
+          <p:cNvPr id="4" name="图片 3"/>
+          <p:cNvPicPr>
+            <a:picLocks noChangeAspect="1"/>
+          </p:cNvPicPr>
+          <p:nvPr/>
+        </p:nvPicPr>
+        <p:blipFill rotWithShape="1">
+          <a:blip r:embed="rId3"/>
+          <a:srcRect t="50956"/>
+          <a:stretch/>
+        </p:blipFill>
+        <p:spPr>
+          <a:xfrm>
+            <a:off x="0" y="2179160"/>
+            <a:ext cx="5106838" cy="2929815"/>
+          </a:xfrm>
+          <a:prstGeom prst="rect">
+            <a:avLst/>
+          </a:prstGeom>
+        </p:spPr>
+      </p:pic>
+      <p:pic>
+        <p:nvPicPr>
+          <p:cNvPr id="7" name="图片 6"/>
+          <p:cNvPicPr>
+            <a:picLocks noChangeAspect="1"/>
+          </p:cNvPicPr>
+          <p:nvPr/>
+        </p:nvPicPr>
+        <p:blipFill rotWithShape="1">
+          <a:blip r:embed="rId3"/>
+          <a:srcRect r="4643" b="49910"/>
+          <a:stretch/>
+        </p:blipFill>
+        <p:spPr>
+          <a:xfrm>
+            <a:off x="4258394" y="2871921"/>
+            <a:ext cx="4868353" cy="2991427"/>
+          </a:xfrm>
+          <a:prstGeom prst="rect">
+            <a:avLst/>
+          </a:prstGeom>
+        </p:spPr>
+      </p:pic>
+    </p:spTree>
+    <p:extLst>
+      <p:ext uri="{BB962C8B-B14F-4D97-AF65-F5344CB8AC3E}">
+        <p14:creationId xmlns:p14="http://schemas.microsoft.com/office/powerpoint/2010/main" val="748648133"/>
+      </p:ext>
+    </p:extLst>
+  </p:cSld>
+  <p:clrMapOvr>
+    <a:masterClrMapping/>
+  </p:clrMapOvr>
+  <p:timing>
+    <p:tnLst>
+      <p:par>
+        <p:cTn id="1" dur="indefinite" restart="never" nodeType="tmRoot"/>
+      </p:par>
+    </p:tnLst>
+  </p:timing>
+</p:sld>
+</file>
+
+<file path=ppt/slides/slide28.xml><?xml version="1.0" encoding="utf-8"?>
+<p:sld xmlns:a="http://schemas.openxmlformats.org/drawingml/2006/main" xmlns:r="http://schemas.openxmlformats.org/officeDocument/2006/relationships" xmlns:p="http://schemas.openxmlformats.org/presentationml/2006/main">
+  <p:cSld>
+    <p:spTree>
+      <p:nvGrpSpPr>
+        <p:cNvPr id="1" name=""/>
+        <p:cNvGrpSpPr/>
+        <p:nvPr/>
+      </p:nvGrpSpPr>
+      <p:grpSpPr>
+        <a:xfrm>
+          <a:off x="0" y="0"/>
+          <a:ext cx="0" cy="0"/>
+          <a:chOff x="0" y="0"/>
+          <a:chExt cx="0" cy="0"/>
+        </a:xfrm>
+      </p:grpSpPr>
+      <p:sp>
+        <p:nvSpPr>
+          <p:cNvPr id="2" name="标题 1"/>
+          <p:cNvSpPr>
+            <a:spLocks noGrp="1"/>
+          </p:cNvSpPr>
+          <p:nvPr>
+            <p:ph type="title"/>
+          </p:nvPr>
+        </p:nvSpPr>
+        <p:spPr/>
+        <p:txBody>
+          <a:bodyPr/>
+          <a:lstStyle/>
+          <a:p>
+            <a:r>
               <a:rPr lang="en-US" altLang="zh-CN" b="1" dirty="0" smtClean="0"/>
               <a:t>TSP</a:t>
             </a:r>
@@ -10676,13 +12110,153 @@
           <a:bodyPr/>
           <a:lstStyle/>
           <a:p>
+            <a:pPr>
+              <a:lnSpc>
+                <a:spcPct val="200000"/>
+              </a:lnSpc>
+            </a:pPr>
             <a:r>
               <a:rPr lang="zh-CN" altLang="en-US" dirty="0" smtClean="0"/>
+              <a:t>准备数据</a:t>
+            </a:r>
+            <a:endParaRPr lang="en-US" altLang="zh-CN" dirty="0" smtClean="0"/>
+          </a:p>
+          <a:p>
+            <a:pPr>
+              <a:lnSpc>
+                <a:spcPct val="200000"/>
+              </a:lnSpc>
+            </a:pPr>
+            <a:r>
+              <a:rPr lang="zh-CN" altLang="en-US" dirty="0" smtClean="0"/>
+              <a:t>构造求解器</a:t>
+            </a:r>
+            <a:endParaRPr lang="en-US" altLang="zh-CN" dirty="0" smtClean="0"/>
+          </a:p>
+          <a:p>
+            <a:pPr>
+              <a:lnSpc>
+                <a:spcPct val="200000"/>
+              </a:lnSpc>
+            </a:pPr>
+            <a:r>
+              <a:rPr lang="zh-CN" altLang="en-US" dirty="0"/>
               <a:t>准备</a:t>
             </a:r>
             <a:r>
+              <a:rPr lang="en-US" altLang="zh-CN" dirty="0"/>
+              <a:t>callback</a:t>
+            </a:r>
+            <a:r>
               <a:rPr lang="zh-CN" altLang="en-US" dirty="0" smtClean="0"/>
-              <a:t>数据</a:t>
+              <a:t>函数</a:t>
+            </a:r>
+            <a:endParaRPr lang="en-US" altLang="zh-CN" dirty="0" smtClean="0"/>
+          </a:p>
+          <a:p>
+            <a:pPr>
+              <a:lnSpc>
+                <a:spcPct val="200000"/>
+              </a:lnSpc>
+            </a:pPr>
+            <a:r>
+              <a:rPr lang="zh-CN" altLang="en-US" dirty="0"/>
+              <a:t>调用求解器</a:t>
+            </a:r>
+          </a:p>
+          <a:p>
+            <a:pPr marL="0" indent="0">
+              <a:lnSpc>
+                <a:spcPct val="200000"/>
+              </a:lnSpc>
+              <a:buNone/>
+            </a:pPr>
+            <a:endParaRPr lang="zh-CN" altLang="en-US" dirty="0"/>
+          </a:p>
+        </p:txBody>
+      </p:sp>
+    </p:spTree>
+    <p:extLst>
+      <p:ext uri="{BB962C8B-B14F-4D97-AF65-F5344CB8AC3E}">
+        <p14:creationId xmlns:p14="http://schemas.microsoft.com/office/powerpoint/2010/main" val="100844049"/>
+      </p:ext>
+    </p:extLst>
+  </p:cSld>
+  <p:clrMapOvr>
+    <a:masterClrMapping/>
+  </p:clrMapOvr>
+  <p:timing>
+    <p:tnLst>
+      <p:par>
+        <p:cTn id="1" dur="indefinite" restart="never" nodeType="tmRoot"/>
+      </p:par>
+    </p:tnLst>
+  </p:timing>
+</p:sld>
+</file>
+
+<file path=ppt/slides/slide29.xml><?xml version="1.0" encoding="utf-8"?>
+<p:sld xmlns:a="http://schemas.openxmlformats.org/drawingml/2006/main" xmlns:r="http://schemas.openxmlformats.org/officeDocument/2006/relationships" xmlns:p="http://schemas.openxmlformats.org/presentationml/2006/main">
+  <p:cSld>
+    <p:spTree>
+      <p:nvGrpSpPr>
+        <p:cNvPr id="1" name=""/>
+        <p:cNvGrpSpPr/>
+        <p:nvPr/>
+      </p:nvGrpSpPr>
+      <p:grpSpPr>
+        <a:xfrm>
+          <a:off x="0" y="0"/>
+          <a:ext cx="0" cy="0"/>
+          <a:chOff x="0" y="0"/>
+          <a:chExt cx="0" cy="0"/>
+        </a:xfrm>
+      </p:grpSpPr>
+      <p:sp>
+        <p:nvSpPr>
+          <p:cNvPr id="2" name="标题 1"/>
+          <p:cNvSpPr>
+            <a:spLocks noGrp="1"/>
+          </p:cNvSpPr>
+          <p:nvPr>
+            <p:ph type="title"/>
+          </p:nvPr>
+        </p:nvSpPr>
+        <p:spPr/>
+        <p:txBody>
+          <a:bodyPr/>
+          <a:lstStyle/>
+          <a:p>
+            <a:r>
+              <a:rPr lang="en-US" altLang="zh-CN" b="1" dirty="0" smtClean="0"/>
+              <a:t>TSP</a:t>
+            </a:r>
+            <a:r>
+              <a:rPr lang="zh-CN" altLang="en-US" b="1" dirty="0" smtClean="0"/>
+              <a:t>问题示例</a:t>
+            </a:r>
+            <a:endParaRPr lang="zh-CN" altLang="en-US" b="1" dirty="0"/>
+          </a:p>
+        </p:txBody>
+      </p:sp>
+      <p:sp>
+        <p:nvSpPr>
+          <p:cNvPr id="3" name="内容占位符 2"/>
+          <p:cNvSpPr>
+            <a:spLocks noGrp="1"/>
+          </p:cNvSpPr>
+          <p:nvPr>
+            <p:ph idx="1"/>
+          </p:nvPr>
+        </p:nvSpPr>
+        <p:spPr/>
+        <p:txBody>
+          <a:bodyPr/>
+          <a:lstStyle/>
+          <a:p>
+            <a:r>
+              <a:rPr lang="zh-CN" altLang="en-US" dirty="0" smtClean="0"/>
+              <a:t>准备数据</a:t>
             </a:r>
             <a:r>
               <a:rPr lang="en-US" altLang="zh-CN" dirty="0" smtClean="0"/>
@@ -10756,7 +12330,7 @@
 </p:sld>
 </file>
 
-<file path=ppt/slides/slide26.xml><?xml version="1.0" encoding="utf-8"?>
+<file path=ppt/slides/slide3.xml><?xml version="1.0" encoding="utf-8"?>
 <p:sld xmlns:a="http://schemas.openxmlformats.org/drawingml/2006/main" xmlns:r="http://schemas.openxmlformats.org/officeDocument/2006/relationships" xmlns:p="http://schemas.openxmlformats.org/presentationml/2006/main">
   <p:cSld>
     <p:spTree>
@@ -10789,6 +12363,176 @@
           <a:lstStyle/>
           <a:p>
             <a:r>
+              <a:rPr lang="en-US" altLang="zh-CN" b="1" dirty="0"/>
+              <a:t>TSP</a:t>
+            </a:r>
+            <a:r>
+              <a:rPr lang="zh-CN" altLang="en-US" b="1" dirty="0" smtClean="0"/>
+              <a:t>问题</a:t>
+            </a:r>
+            <a:endParaRPr lang="zh-CN" altLang="en-US" dirty="0"/>
+          </a:p>
+        </p:txBody>
+      </p:sp>
+      <p:sp>
+        <p:nvSpPr>
+          <p:cNvPr id="3" name="内容占位符 2"/>
+          <p:cNvSpPr>
+            <a:spLocks noGrp="1"/>
+          </p:cNvSpPr>
+          <p:nvPr>
+            <p:ph idx="1"/>
+          </p:nvPr>
+        </p:nvSpPr>
+        <p:spPr>
+          <a:xfrm>
+            <a:off x="628650" y="1256232"/>
+            <a:ext cx="4416316" cy="4920731"/>
+          </a:xfrm>
+        </p:spPr>
+        <p:txBody>
+          <a:bodyPr>
+            <a:normAutofit fontScale="92500"/>
+          </a:bodyPr>
+          <a:lstStyle/>
+          <a:p>
+            <a:pPr>
+              <a:lnSpc>
+                <a:spcPct val="120000"/>
+              </a:lnSpc>
+            </a:pPr>
+            <a:r>
+              <a:rPr lang="zh-CN" altLang="en-US" dirty="0"/>
+              <a:t>旅行推销员问题</a:t>
+            </a:r>
+            <a:r>
+              <a:rPr lang="zh-CN" altLang="en-US" dirty="0" smtClean="0"/>
+              <a:t>（</a:t>
+            </a:r>
+            <a:r>
+              <a:rPr lang="en-US" altLang="zh-CN" dirty="0" smtClean="0"/>
+              <a:t>Travelling </a:t>
+            </a:r>
+            <a:r>
+              <a:rPr lang="en-US" altLang="zh-CN" dirty="0"/>
+              <a:t>salesman problem, TSP</a:t>
+            </a:r>
+            <a:r>
+              <a:rPr lang="zh-CN" altLang="en-US" dirty="0"/>
+              <a:t>）是这样一个问题：给定一系列城市和每对城市之间的距离，求解访问每一座城市一次并回到起始城市的最短回路</a:t>
+            </a:r>
+            <a:r>
+              <a:rPr lang="zh-CN" altLang="en-US" dirty="0" smtClean="0"/>
+              <a:t>。</a:t>
+            </a:r>
+            <a:endParaRPr lang="en-US" altLang="zh-CN" dirty="0" smtClean="0"/>
+          </a:p>
+          <a:p>
+            <a:pPr>
+              <a:lnSpc>
+                <a:spcPct val="120000"/>
+              </a:lnSpc>
+            </a:pPr>
+            <a:r>
+              <a:rPr lang="zh-CN" altLang="en-US" dirty="0" smtClean="0"/>
+              <a:t>它</a:t>
+            </a:r>
+            <a:r>
+              <a:rPr lang="zh-CN" altLang="en-US" dirty="0"/>
+              <a:t>是组合优化中的一个</a:t>
+            </a:r>
+            <a:r>
+              <a:rPr lang="en-US" altLang="zh-CN" dirty="0"/>
+              <a:t>NP</a:t>
+            </a:r>
+            <a:r>
+              <a:rPr lang="zh-CN" altLang="en-US" dirty="0"/>
+              <a:t>困难问题，在运筹学和理论计算机科学中非常重要</a:t>
+            </a:r>
+            <a:r>
+              <a:rPr lang="zh-CN" altLang="en-US" dirty="0" smtClean="0"/>
+              <a:t>。</a:t>
+            </a:r>
+            <a:endParaRPr lang="zh-CN" altLang="en-US" dirty="0"/>
+          </a:p>
+        </p:txBody>
+      </p:sp>
+      <p:pic>
+        <p:nvPicPr>
+          <p:cNvPr id="8" name="图片 7"/>
+          <p:cNvPicPr>
+            <a:picLocks noChangeAspect="1"/>
+          </p:cNvPicPr>
+          <p:nvPr/>
+        </p:nvPicPr>
+        <p:blipFill rotWithShape="1">
+          <a:blip r:embed="rId3"/>
+          <a:srcRect r="10967"/>
+          <a:stretch/>
+        </p:blipFill>
+        <p:spPr>
+          <a:xfrm>
+            <a:off x="5258122" y="1886852"/>
+            <a:ext cx="3872848" cy="2701979"/>
+          </a:xfrm>
+          <a:prstGeom prst="rect">
+            <a:avLst/>
+          </a:prstGeom>
+        </p:spPr>
+      </p:pic>
+    </p:spTree>
+    <p:extLst>
+      <p:ext uri="{BB962C8B-B14F-4D97-AF65-F5344CB8AC3E}">
+        <p14:creationId xmlns:p14="http://schemas.microsoft.com/office/powerpoint/2010/main" val="758179840"/>
+      </p:ext>
+    </p:extLst>
+  </p:cSld>
+  <p:clrMapOvr>
+    <a:masterClrMapping/>
+  </p:clrMapOvr>
+  <p:timing>
+    <p:tnLst>
+      <p:par>
+        <p:cTn id="1" dur="indefinite" restart="never" nodeType="tmRoot"/>
+      </p:par>
+    </p:tnLst>
+  </p:timing>
+</p:sld>
+</file>
+
+<file path=ppt/slides/slide30.xml><?xml version="1.0" encoding="utf-8"?>
+<p:sld xmlns:a="http://schemas.openxmlformats.org/drawingml/2006/main" xmlns:r="http://schemas.openxmlformats.org/officeDocument/2006/relationships" xmlns:p="http://schemas.openxmlformats.org/presentationml/2006/main">
+  <p:cSld>
+    <p:spTree>
+      <p:nvGrpSpPr>
+        <p:cNvPr id="1" name=""/>
+        <p:cNvGrpSpPr/>
+        <p:nvPr/>
+      </p:nvGrpSpPr>
+      <p:grpSpPr>
+        <a:xfrm>
+          <a:off x="0" y="0"/>
+          <a:ext cx="0" cy="0"/>
+          <a:chOff x="0" y="0"/>
+          <a:chExt cx="0" cy="0"/>
+        </a:xfrm>
+      </p:grpSpPr>
+      <p:sp>
+        <p:nvSpPr>
+          <p:cNvPr id="2" name="标题 1"/>
+          <p:cNvSpPr>
+            <a:spLocks noGrp="1"/>
+          </p:cNvSpPr>
+          <p:nvPr>
+            <p:ph type="title"/>
+          </p:nvPr>
+        </p:nvSpPr>
+        <p:spPr/>
+        <p:txBody>
+          <a:bodyPr/>
+          <a:lstStyle/>
+          <a:p>
+            <a:r>
               <a:rPr lang="en-US" altLang="zh-CN" b="1" dirty="0" smtClean="0"/>
               <a:t>TSP</a:t>
             </a:r>
@@ -10817,11 +12561,7 @@
           <a:p>
             <a:r>
               <a:rPr lang="zh-CN" altLang="en-US" dirty="0" smtClean="0"/>
-              <a:t>构造求解</a:t>
-            </a:r>
-            <a:r>
-              <a:rPr lang="zh-CN" altLang="en-US" dirty="0" smtClean="0"/>
-              <a:t>器</a:t>
+              <a:t>构造求解器</a:t>
             </a:r>
             <a:endParaRPr lang="en-US" altLang="zh-CN" dirty="0" smtClean="0"/>
           </a:p>
@@ -10882,7 +12622,7 @@
 </p:sld>
 </file>
 
-<file path=ppt/slides/slide27.xml><?xml version="1.0" encoding="utf-8"?>
+<file path=ppt/slides/slide31.xml><?xml version="1.0" encoding="utf-8"?>
 <p:sld xmlns:a="http://schemas.openxmlformats.org/drawingml/2006/main" xmlns:r="http://schemas.openxmlformats.org/officeDocument/2006/relationships" xmlns:p="http://schemas.openxmlformats.org/presentationml/2006/main">
   <p:cSld>
     <p:spTree>
@@ -10943,11 +12683,7 @@
           <a:p>
             <a:r>
               <a:rPr lang="zh-CN" altLang="en-US" dirty="0" smtClean="0"/>
-              <a:t>构造求解</a:t>
-            </a:r>
-            <a:r>
-              <a:rPr lang="zh-CN" altLang="en-US" dirty="0" smtClean="0"/>
-              <a:t>器</a:t>
+              <a:t>构造求解器</a:t>
             </a:r>
             <a:endParaRPr lang="en-US" altLang="zh-CN" dirty="0" smtClean="0"/>
           </a:p>
@@ -11009,7 +12745,7 @@
 </p:sld>
 </file>
 
-<file path=ppt/slides/slide28.xml><?xml version="1.0" encoding="utf-8"?>
+<file path=ppt/slides/slide32.xml><?xml version="1.0" encoding="utf-8"?>
 <p:sld xmlns:a="http://schemas.openxmlformats.org/drawingml/2006/main" xmlns:r="http://schemas.openxmlformats.org/officeDocument/2006/relationships" xmlns:p="http://schemas.openxmlformats.org/presentationml/2006/main">
   <p:cSld>
     <p:spTree>
@@ -11280,7 +13016,7 @@
 </p:sld>
 </file>
 
-<file path=ppt/slides/slide29.xml><?xml version="1.0" encoding="utf-8"?>
+<file path=ppt/slides/slide33.xml><?xml version="1.0" encoding="utf-8"?>
 <p:sld xmlns:a="http://schemas.openxmlformats.org/drawingml/2006/main" xmlns:r="http://schemas.openxmlformats.org/officeDocument/2006/relationships" xmlns:p="http://schemas.openxmlformats.org/presentationml/2006/main">
   <p:cSld>
     <p:spTree>
@@ -11377,7 +13113,6 @@
               <a:rPr lang="zh-CN" altLang="en-US" dirty="0"/>
               <a:t>输出示例</a:t>
             </a:r>
-            <a:endParaRPr lang="zh-CN" altLang="en-US" dirty="0"/>
           </a:p>
         </p:txBody>
       </p:sp>
@@ -11448,177 +13183,7 @@
 </p:sld>
 </file>
 
-<file path=ppt/slides/slide3.xml><?xml version="1.0" encoding="utf-8"?>
-<p:sld xmlns:a="http://schemas.openxmlformats.org/drawingml/2006/main" xmlns:r="http://schemas.openxmlformats.org/officeDocument/2006/relationships" xmlns:p="http://schemas.openxmlformats.org/presentationml/2006/main">
-  <p:cSld>
-    <p:spTree>
-      <p:nvGrpSpPr>
-        <p:cNvPr id="1" name=""/>
-        <p:cNvGrpSpPr/>
-        <p:nvPr/>
-      </p:nvGrpSpPr>
-      <p:grpSpPr>
-        <a:xfrm>
-          <a:off x="0" y="0"/>
-          <a:ext cx="0" cy="0"/>
-          <a:chOff x="0" y="0"/>
-          <a:chExt cx="0" cy="0"/>
-        </a:xfrm>
-      </p:grpSpPr>
-      <p:sp>
-        <p:nvSpPr>
-          <p:cNvPr id="2" name="标题 1"/>
-          <p:cNvSpPr>
-            <a:spLocks noGrp="1"/>
-          </p:cNvSpPr>
-          <p:nvPr>
-            <p:ph type="title"/>
-          </p:nvPr>
-        </p:nvSpPr>
-        <p:spPr/>
-        <p:txBody>
-          <a:bodyPr/>
-          <a:lstStyle/>
-          <a:p>
-            <a:r>
-              <a:rPr lang="en-US" altLang="zh-CN" b="1" dirty="0"/>
-              <a:t>TSP</a:t>
-            </a:r>
-            <a:r>
-              <a:rPr lang="zh-CN" altLang="en-US" b="1" dirty="0" smtClean="0"/>
-              <a:t>问题</a:t>
-            </a:r>
-            <a:endParaRPr lang="zh-CN" altLang="en-US" dirty="0"/>
-          </a:p>
-        </p:txBody>
-      </p:sp>
-      <p:sp>
-        <p:nvSpPr>
-          <p:cNvPr id="3" name="内容占位符 2"/>
-          <p:cNvSpPr>
-            <a:spLocks noGrp="1"/>
-          </p:cNvSpPr>
-          <p:nvPr>
-            <p:ph idx="1"/>
-          </p:nvPr>
-        </p:nvSpPr>
-        <p:spPr>
-          <a:xfrm>
-            <a:off x="628650" y="1256232"/>
-            <a:ext cx="4416316" cy="4920731"/>
-          </a:xfrm>
-        </p:spPr>
-        <p:txBody>
-          <a:bodyPr>
-            <a:normAutofit fontScale="92500"/>
-          </a:bodyPr>
-          <a:lstStyle/>
-          <a:p>
-            <a:pPr>
-              <a:lnSpc>
-                <a:spcPct val="120000"/>
-              </a:lnSpc>
-            </a:pPr>
-            <a:r>
-              <a:rPr lang="zh-CN" altLang="en-US" dirty="0"/>
-              <a:t>旅行推销员问题</a:t>
-            </a:r>
-            <a:r>
-              <a:rPr lang="zh-CN" altLang="en-US" dirty="0" smtClean="0"/>
-              <a:t>（</a:t>
-            </a:r>
-            <a:r>
-              <a:rPr lang="en-US" altLang="zh-CN" dirty="0" smtClean="0"/>
-              <a:t>Travelling </a:t>
-            </a:r>
-            <a:r>
-              <a:rPr lang="en-US" altLang="zh-CN" dirty="0"/>
-              <a:t>salesman problem, TSP</a:t>
-            </a:r>
-            <a:r>
-              <a:rPr lang="zh-CN" altLang="en-US" dirty="0"/>
-              <a:t>）是这样一个问题：给定一系列城市和每对城市之间的距离，求解访问每一座城市一次并回到起始城市的最短回路</a:t>
-            </a:r>
-            <a:r>
-              <a:rPr lang="zh-CN" altLang="en-US" dirty="0" smtClean="0"/>
-              <a:t>。</a:t>
-            </a:r>
-            <a:endParaRPr lang="en-US" altLang="zh-CN" dirty="0" smtClean="0"/>
-          </a:p>
-          <a:p>
-            <a:pPr>
-              <a:lnSpc>
-                <a:spcPct val="120000"/>
-              </a:lnSpc>
-            </a:pPr>
-            <a:r>
-              <a:rPr lang="zh-CN" altLang="en-US" dirty="0" smtClean="0"/>
-              <a:t>它</a:t>
-            </a:r>
-            <a:r>
-              <a:rPr lang="zh-CN" altLang="en-US" dirty="0"/>
-              <a:t>是组合优化中的一个</a:t>
-            </a:r>
-            <a:r>
-              <a:rPr lang="en-US" altLang="zh-CN" dirty="0"/>
-              <a:t>NP</a:t>
-            </a:r>
-            <a:r>
-              <a:rPr lang="zh-CN" altLang="en-US" dirty="0"/>
-              <a:t>困难问题，在运筹学和理论计算机科学中非常重要</a:t>
-            </a:r>
-            <a:r>
-              <a:rPr lang="zh-CN" altLang="en-US" dirty="0" smtClean="0"/>
-              <a:t>。</a:t>
-            </a:r>
-            <a:endParaRPr lang="zh-CN" altLang="en-US" dirty="0"/>
-          </a:p>
-        </p:txBody>
-      </p:sp>
-      <p:pic>
-        <p:nvPicPr>
-          <p:cNvPr id="8" name="图片 7"/>
-          <p:cNvPicPr>
-            <a:picLocks noChangeAspect="1"/>
-          </p:cNvPicPr>
-          <p:nvPr/>
-        </p:nvPicPr>
-        <p:blipFill rotWithShape="1">
-          <a:blip r:embed="rId3"/>
-          <a:srcRect r="10967"/>
-          <a:stretch/>
-        </p:blipFill>
-        <p:spPr>
-          <a:xfrm>
-            <a:off x="5258122" y="1886852"/>
-            <a:ext cx="3872848" cy="2701979"/>
-          </a:xfrm>
-          <a:prstGeom prst="rect">
-            <a:avLst/>
-          </a:prstGeom>
-        </p:spPr>
-      </p:pic>
-    </p:spTree>
-    <p:extLst>
-      <p:ext uri="{BB962C8B-B14F-4D97-AF65-F5344CB8AC3E}">
-        <p14:creationId xmlns:p14="http://schemas.microsoft.com/office/powerpoint/2010/main" val="758179840"/>
-      </p:ext>
-    </p:extLst>
-  </p:cSld>
-  <p:clrMapOvr>
-    <a:masterClrMapping/>
-  </p:clrMapOvr>
-  <p:timing>
-    <p:tnLst>
-      <p:par>
-        <p:cTn id="1" dur="indefinite" restart="never" nodeType="tmRoot"/>
-      </p:par>
-    </p:tnLst>
-  </p:timing>
-</p:sld>
-</file>
-
-<file path=ppt/slides/slide30.xml><?xml version="1.0" encoding="utf-8"?>
+<file path=ppt/slides/slide34.xml><?xml version="1.0" encoding="utf-8"?>
 <p:sld xmlns:a="http://schemas.openxmlformats.org/drawingml/2006/main" xmlns:r="http://schemas.openxmlformats.org/officeDocument/2006/relationships" xmlns:p="http://schemas.openxmlformats.org/presentationml/2006/main">
   <p:cSld>
     <p:spTree>
@@ -11787,7 +13352,7 @@
 </p:sld>
 </file>
 
-<file path=ppt/slides/slide31.xml><?xml version="1.0" encoding="utf-8"?>
+<file path=ppt/slides/slide35.xml><?xml version="1.0" encoding="utf-8"?>
 <p:sld xmlns:a="http://schemas.openxmlformats.org/drawingml/2006/main" xmlns:r="http://schemas.openxmlformats.org/officeDocument/2006/relationships" xmlns:p="http://schemas.openxmlformats.org/presentationml/2006/main">
   <p:cSld>
     <p:spTree>
@@ -11903,7 +13468,7 @@
 </p:sld>
 </file>
 
-<file path=ppt/slides/slide32.xml><?xml version="1.0" encoding="utf-8"?>
+<file path=ppt/slides/slide36.xml><?xml version="1.0" encoding="utf-8"?>
 <p:sld xmlns:a="http://schemas.openxmlformats.org/drawingml/2006/main" xmlns:r="http://schemas.openxmlformats.org/officeDocument/2006/relationships" xmlns:p="http://schemas.openxmlformats.org/presentationml/2006/main">
   <p:cSld>
     <p:spTree>
@@ -11973,7 +13538,6 @@
               <a:rPr lang="zh-CN" altLang="en-US" dirty="0"/>
               <a:t>的调用函数</a:t>
             </a:r>
-            <a:endParaRPr lang="zh-CN" altLang="en-US" dirty="0"/>
           </a:p>
         </p:txBody>
       </p:sp>
@@ -12021,7 +13585,7 @@
 </p:sld>
 </file>
 
-<file path=ppt/slides/slide33.xml><?xml version="1.0" encoding="utf-8"?>
+<file path=ppt/slides/slide37.xml><?xml version="1.0" encoding="utf-8"?>
 <p:sld xmlns:a="http://schemas.openxmlformats.org/drawingml/2006/main" xmlns:r="http://schemas.openxmlformats.org/officeDocument/2006/relationships" xmlns:p="http://schemas.openxmlformats.org/presentationml/2006/main">
   <p:cSld>
     <p:spTree>
@@ -12872,7 +14436,7 @@
 </p:sld>
 </file>
 
-<file path=ppt/slides/slide34.xml><?xml version="1.0" encoding="utf-8"?>
+<file path=ppt/slides/slide38.xml><?xml version="1.0" encoding="utf-8"?>
 <p:sld xmlns:a="http://schemas.openxmlformats.org/drawingml/2006/main" xmlns:r="http://schemas.openxmlformats.org/officeDocument/2006/relationships" xmlns:p="http://schemas.openxmlformats.org/presentationml/2006/main">
   <p:cSld>
     <p:spTree>
@@ -12912,7 +14476,6 @@
               <a:rPr lang="zh-CN" altLang="en-US" b="1" dirty="0"/>
               <a:t>问题示例</a:t>
             </a:r>
-            <a:endParaRPr lang="zh-CN" altLang="en-US" b="1" dirty="0"/>
           </a:p>
         </p:txBody>
       </p:sp>
@@ -12935,11 +14498,7 @@
           <a:p>
             <a:r>
               <a:rPr lang="zh-CN" altLang="en-US" sz="3200" b="1" dirty="0" smtClean="0"/>
-              <a:t>加入</a:t>
-            </a:r>
-            <a:r>
-              <a:rPr lang="zh-CN" altLang="en-US" sz="3200" b="1" dirty="0" smtClean="0"/>
-              <a:t>约束</a:t>
+              <a:t>加入约束</a:t>
             </a:r>
             <a:endParaRPr lang="en-US" altLang="zh-CN" sz="3200" b="1" dirty="0" smtClean="0"/>
           </a:p>
@@ -12995,7 +14554,7 @@
 </p:sld>
 </file>
 
-<file path=ppt/slides/slide35.xml><?xml version="1.0" encoding="utf-8"?>
+<file path=ppt/slides/slide39.xml><?xml version="1.0" encoding="utf-8"?>
 <p:sld xmlns:a="http://schemas.openxmlformats.org/drawingml/2006/main" xmlns:r="http://schemas.openxmlformats.org/officeDocument/2006/relationships" xmlns:p="http://schemas.openxmlformats.org/presentationml/2006/main">
   <p:cSld>
     <p:spTree>
@@ -13056,11 +14615,7 @@
           <a:p>
             <a:r>
               <a:rPr lang="zh-CN" altLang="en-US" b="1" dirty="0" smtClean="0"/>
-              <a:t>示例</a:t>
-            </a:r>
-            <a:r>
-              <a:rPr lang="zh-CN" altLang="en-US" b="1" dirty="0" smtClean="0"/>
-              <a:t>输出</a:t>
+              <a:t>示例输出</a:t>
             </a:r>
             <a:endParaRPr lang="en-US" altLang="zh-CN" b="1" dirty="0" smtClean="0"/>
           </a:p>
@@ -13100,577 +14655,6 @@
     <p:extLst>
       <p:ext uri="{BB962C8B-B14F-4D97-AF65-F5344CB8AC3E}">
         <p14:creationId xmlns:p14="http://schemas.microsoft.com/office/powerpoint/2010/main" val="2552498086"/>
-      </p:ext>
-    </p:extLst>
-  </p:cSld>
-  <p:clrMapOvr>
-    <a:masterClrMapping/>
-  </p:clrMapOvr>
-  <p:timing>
-    <p:tnLst>
-      <p:par>
-        <p:cTn id="1" dur="indefinite" restart="never" nodeType="tmRoot"/>
-      </p:par>
-    </p:tnLst>
-  </p:timing>
-</p:sld>
-</file>
-
-<file path=ppt/slides/slide36.xml><?xml version="1.0" encoding="utf-8"?>
-<p:sld xmlns:a="http://schemas.openxmlformats.org/drawingml/2006/main" xmlns:r="http://schemas.openxmlformats.org/officeDocument/2006/relationships" xmlns:p="http://schemas.openxmlformats.org/presentationml/2006/main">
-  <p:cSld>
-    <p:spTree>
-      <p:nvGrpSpPr>
-        <p:cNvPr id="1" name=""/>
-        <p:cNvGrpSpPr/>
-        <p:nvPr/>
-      </p:nvGrpSpPr>
-      <p:grpSpPr>
-        <a:xfrm>
-          <a:off x="0" y="0"/>
-          <a:ext cx="0" cy="0"/>
-          <a:chOff x="0" y="0"/>
-          <a:chExt cx="0" cy="0"/>
-        </a:xfrm>
-      </p:grpSpPr>
-      <p:sp>
-        <p:nvSpPr>
-          <p:cNvPr id="2" name="标题 1"/>
-          <p:cNvSpPr>
-            <a:spLocks noGrp="1"/>
-          </p:cNvSpPr>
-          <p:nvPr>
-            <p:ph type="title"/>
-          </p:nvPr>
-        </p:nvSpPr>
-        <p:spPr/>
-        <p:txBody>
-          <a:bodyPr/>
-          <a:lstStyle/>
-          <a:p>
-            <a:r>
-              <a:rPr lang="en-US" altLang="zh-CN" b="1" dirty="0" smtClean="0"/>
-              <a:t>VRPTW</a:t>
-            </a:r>
-            <a:r>
-              <a:rPr lang="zh-CN" altLang="en-US" b="1" dirty="0" smtClean="0"/>
-              <a:t>示例</a:t>
-            </a:r>
-            <a:endParaRPr lang="zh-CN" altLang="en-US" dirty="0"/>
-          </a:p>
-        </p:txBody>
-      </p:sp>
-      <p:sp>
-        <p:nvSpPr>
-          <p:cNvPr id="3" name="内容占位符 2"/>
-          <p:cNvSpPr>
-            <a:spLocks noGrp="1"/>
-          </p:cNvSpPr>
-          <p:nvPr>
-            <p:ph idx="1"/>
-          </p:nvPr>
-        </p:nvSpPr>
-        <p:spPr/>
-        <p:txBody>
-          <a:bodyPr/>
-          <a:lstStyle/>
-          <a:p>
-            <a:pPr>
-              <a:lnSpc>
-                <a:spcPct val="150000"/>
-              </a:lnSpc>
-            </a:pPr>
-            <a:r>
-              <a:rPr lang="zh-CN" altLang="en-US" dirty="0" smtClean="0"/>
-              <a:t>问题说明：</a:t>
-            </a:r>
-            <a:endParaRPr lang="en-US" altLang="zh-CN" dirty="0" smtClean="0"/>
-          </a:p>
-          <a:p>
-            <a:pPr marL="0" indent="0">
-              <a:lnSpc>
-                <a:spcPct val="150000"/>
-              </a:lnSpc>
-              <a:buNone/>
-            </a:pPr>
-            <a:r>
-              <a:rPr lang="en-US" altLang="zh-CN" dirty="0" smtClean="0"/>
-              <a:t>    VRP + Time Windows</a:t>
-            </a:r>
-            <a:r>
-              <a:rPr lang="en-US" altLang="zh-CN" dirty="0" smtClean="0"/>
-              <a:t>.</a:t>
-            </a:r>
-          </a:p>
-          <a:p>
-            <a:pPr marL="0" indent="0">
-              <a:lnSpc>
-                <a:spcPct val="150000"/>
-              </a:lnSpc>
-              <a:buNone/>
-            </a:pPr>
-            <a:r>
-              <a:rPr lang="zh-CN" altLang="en-US" dirty="0" smtClean="0"/>
-              <a:t>在</a:t>
-            </a:r>
-            <a:r>
-              <a:rPr lang="zh-CN" altLang="en-US" dirty="0"/>
-              <a:t>这个例子中，我们定义总的时间为服务时间</a:t>
-            </a:r>
-            <a:r>
-              <a:rPr lang="en-US" altLang="zh-CN" dirty="0"/>
-              <a:t>+</a:t>
-            </a:r>
-            <a:r>
-              <a:rPr lang="zh-CN" altLang="en-US" dirty="0"/>
-              <a:t>路上花费的时间，其中服务时间与每个站点所需货物量成正比，路上花费的时间跟站点间的距离成正比。</a:t>
-            </a:r>
-            <a:endParaRPr lang="zh-CN" altLang="en-US" dirty="0"/>
-          </a:p>
-        </p:txBody>
-      </p:sp>
-    </p:spTree>
-    <p:extLst>
-      <p:ext uri="{BB962C8B-B14F-4D97-AF65-F5344CB8AC3E}">
-        <p14:creationId xmlns:p14="http://schemas.microsoft.com/office/powerpoint/2010/main" val="3000136816"/>
-      </p:ext>
-    </p:extLst>
-  </p:cSld>
-  <p:clrMapOvr>
-    <a:masterClrMapping/>
-  </p:clrMapOvr>
-  <p:timing>
-    <p:tnLst>
-      <p:par>
-        <p:cTn id="1" dur="indefinite" restart="never" nodeType="tmRoot"/>
-      </p:par>
-    </p:tnLst>
-  </p:timing>
-</p:sld>
-</file>
-
-<file path=ppt/slides/slide37.xml><?xml version="1.0" encoding="utf-8"?>
-<p:sld xmlns:a="http://schemas.openxmlformats.org/drawingml/2006/main" xmlns:r="http://schemas.openxmlformats.org/officeDocument/2006/relationships" xmlns:p="http://schemas.openxmlformats.org/presentationml/2006/main">
-  <p:cSld>
-    <p:spTree>
-      <p:nvGrpSpPr>
-        <p:cNvPr id="1" name=""/>
-        <p:cNvGrpSpPr/>
-        <p:nvPr/>
-      </p:nvGrpSpPr>
-      <p:grpSpPr>
-        <a:xfrm>
-          <a:off x="0" y="0"/>
-          <a:ext cx="0" cy="0"/>
-          <a:chOff x="0" y="0"/>
-          <a:chExt cx="0" cy="0"/>
-        </a:xfrm>
-      </p:grpSpPr>
-      <p:sp>
-        <p:nvSpPr>
-          <p:cNvPr id="2" name="标题 1"/>
-          <p:cNvSpPr>
-            <a:spLocks noGrp="1"/>
-          </p:cNvSpPr>
-          <p:nvPr>
-            <p:ph type="title"/>
-          </p:nvPr>
-        </p:nvSpPr>
-        <p:spPr/>
-        <p:txBody>
-          <a:bodyPr/>
-          <a:lstStyle/>
-          <a:p>
-            <a:r>
-              <a:rPr lang="en-US" altLang="zh-CN" b="1" dirty="0" smtClean="0"/>
-              <a:t>VRPTW</a:t>
-            </a:r>
-            <a:r>
-              <a:rPr lang="zh-CN" altLang="en-US" b="1" dirty="0" smtClean="0"/>
-              <a:t>示例</a:t>
-            </a:r>
-            <a:endParaRPr lang="zh-CN" altLang="en-US" dirty="0"/>
-          </a:p>
-        </p:txBody>
-      </p:sp>
-      <p:sp>
-        <p:nvSpPr>
-          <p:cNvPr id="3" name="内容占位符 2"/>
-          <p:cNvSpPr>
-            <a:spLocks noGrp="1"/>
-          </p:cNvSpPr>
-          <p:nvPr>
-            <p:ph idx="1"/>
-          </p:nvPr>
-        </p:nvSpPr>
-        <p:spPr/>
-        <p:txBody>
-          <a:bodyPr/>
-          <a:lstStyle/>
-          <a:p>
-            <a:pPr>
-              <a:lnSpc>
-                <a:spcPct val="150000"/>
-              </a:lnSpc>
-            </a:pPr>
-            <a:r>
-              <a:rPr lang="zh-CN" altLang="en-US" dirty="0" smtClean="0"/>
-              <a:t>准备数据</a:t>
-            </a:r>
-            <a:r>
-              <a:rPr lang="zh-CN" altLang="en-US" dirty="0" smtClean="0"/>
-              <a:t>：</a:t>
-            </a:r>
-            <a:endParaRPr lang="en-US" altLang="zh-CN" dirty="0" smtClean="0"/>
-          </a:p>
-          <a:p>
-            <a:pPr marL="0" indent="0">
-              <a:lnSpc>
-                <a:spcPct val="150000"/>
-              </a:lnSpc>
-              <a:buNone/>
-            </a:pPr>
-            <a:r>
-              <a:rPr lang="en-US" altLang="zh-CN" dirty="0" smtClean="0"/>
-              <a:t>    VRP + Time Windows</a:t>
-            </a:r>
-            <a:r>
-              <a:rPr lang="en-US" altLang="zh-CN" dirty="0" smtClean="0"/>
-              <a:t>.</a:t>
-            </a:r>
-            <a:r>
-              <a:rPr lang="zh-CN" altLang="en-US" dirty="0"/>
-              <a:t>在这个例子中，我们定义总的时间为服务时间</a:t>
-            </a:r>
-            <a:r>
-              <a:rPr lang="en-US" altLang="zh-CN" dirty="0"/>
-              <a:t>+</a:t>
-            </a:r>
-            <a:r>
-              <a:rPr lang="zh-CN" altLang="en-US" dirty="0"/>
-              <a:t>路上花费的时间，其中服务时间与每个站点所需货物量成正比，路上花费的时间跟站点间的距离成正比。</a:t>
-            </a:r>
-            <a:endParaRPr lang="zh-CN" altLang="en-US" dirty="0"/>
-          </a:p>
-        </p:txBody>
-      </p:sp>
-      <p:pic>
-        <p:nvPicPr>
-          <p:cNvPr id="4" name="图片 3"/>
-          <p:cNvPicPr>
-            <a:picLocks noChangeAspect="1"/>
-          </p:cNvPicPr>
-          <p:nvPr/>
-        </p:nvPicPr>
-        <p:blipFill>
-          <a:blip r:embed="rId2"/>
-          <a:stretch>
-            <a:fillRect/>
-          </a:stretch>
-        </p:blipFill>
-        <p:spPr>
-          <a:xfrm>
-            <a:off x="508834" y="2030295"/>
-            <a:ext cx="8219977" cy="3873199"/>
-          </a:xfrm>
-          <a:prstGeom prst="rect">
-            <a:avLst/>
-          </a:prstGeom>
-        </p:spPr>
-      </p:pic>
-    </p:spTree>
-    <p:extLst>
-      <p:ext uri="{BB962C8B-B14F-4D97-AF65-F5344CB8AC3E}">
-        <p14:creationId xmlns:p14="http://schemas.microsoft.com/office/powerpoint/2010/main" val="1578707"/>
-      </p:ext>
-    </p:extLst>
-  </p:cSld>
-  <p:clrMapOvr>
-    <a:masterClrMapping/>
-  </p:clrMapOvr>
-  <p:timing>
-    <p:tnLst>
-      <p:par>
-        <p:cTn id="1" dur="indefinite" restart="never" nodeType="tmRoot"/>
-      </p:par>
-    </p:tnLst>
-  </p:timing>
-</p:sld>
-</file>
-
-<file path=ppt/slides/slide38.xml><?xml version="1.0" encoding="utf-8"?>
-<p:sld xmlns:a="http://schemas.openxmlformats.org/drawingml/2006/main" xmlns:r="http://schemas.openxmlformats.org/officeDocument/2006/relationships" xmlns:p="http://schemas.openxmlformats.org/presentationml/2006/main">
-  <p:cSld>
-    <p:spTree>
-      <p:nvGrpSpPr>
-        <p:cNvPr id="1" name=""/>
-        <p:cNvGrpSpPr/>
-        <p:nvPr/>
-      </p:nvGrpSpPr>
-      <p:grpSpPr>
-        <a:xfrm>
-          <a:off x="0" y="0"/>
-          <a:ext cx="0" cy="0"/>
-          <a:chOff x="0" y="0"/>
-          <a:chExt cx="0" cy="0"/>
-        </a:xfrm>
-      </p:grpSpPr>
-      <p:sp>
-        <p:nvSpPr>
-          <p:cNvPr id="2" name="标题 1"/>
-          <p:cNvSpPr>
-            <a:spLocks noGrp="1"/>
-          </p:cNvSpPr>
-          <p:nvPr>
-            <p:ph type="title"/>
-          </p:nvPr>
-        </p:nvSpPr>
-        <p:spPr/>
-        <p:txBody>
-          <a:bodyPr/>
-          <a:lstStyle/>
-          <a:p>
-            <a:r>
-              <a:rPr lang="en-US" altLang="zh-CN" b="1" dirty="0" smtClean="0"/>
-              <a:t>VRPTW</a:t>
-            </a:r>
-            <a:r>
-              <a:rPr lang="zh-CN" altLang="en-US" b="1" dirty="0" smtClean="0"/>
-              <a:t>示例</a:t>
-            </a:r>
-            <a:endParaRPr lang="zh-CN" altLang="en-US" dirty="0"/>
-          </a:p>
-        </p:txBody>
-      </p:sp>
-      <p:sp>
-        <p:nvSpPr>
-          <p:cNvPr id="3" name="内容占位符 2"/>
-          <p:cNvSpPr>
-            <a:spLocks noGrp="1"/>
-          </p:cNvSpPr>
-          <p:nvPr>
-            <p:ph idx="1"/>
-          </p:nvPr>
-        </p:nvSpPr>
-        <p:spPr/>
-        <p:txBody>
-          <a:bodyPr/>
-          <a:lstStyle/>
-          <a:p>
-            <a:r>
-              <a:rPr lang="zh-CN" altLang="en-US" dirty="0"/>
-              <a:t>定义</a:t>
-            </a:r>
-            <a:r>
-              <a:rPr lang="en-US" altLang="zh-CN" dirty="0"/>
-              <a:t>callback</a:t>
-            </a:r>
-            <a:r>
-              <a:rPr lang="zh-CN" altLang="en-US" dirty="0" smtClean="0"/>
-              <a:t>函数</a:t>
-            </a:r>
-            <a:r>
-              <a:rPr lang="en-US" altLang="zh-CN" dirty="0" smtClean="0"/>
-              <a:t>:</a:t>
-            </a:r>
-          </a:p>
-          <a:p>
-            <a:pPr marL="0" indent="0">
-              <a:buNone/>
-            </a:pPr>
-            <a:r>
-              <a:rPr lang="en-US" altLang="zh-CN" dirty="0"/>
-              <a:t> </a:t>
-            </a:r>
-            <a:r>
-              <a:rPr lang="en-US" altLang="zh-CN" dirty="0" smtClean="0"/>
-              <a:t> </a:t>
-            </a:r>
-            <a:r>
-              <a:rPr lang="zh-CN" altLang="en-US" dirty="0" smtClean="0"/>
-              <a:t>服务时间与</a:t>
-            </a:r>
-            <a:r>
-              <a:rPr lang="zh-CN" altLang="en-US" dirty="0"/>
-              <a:t>每个站点所需货物量</a:t>
-            </a:r>
-            <a:r>
-              <a:rPr lang="zh-CN" altLang="en-US" dirty="0" smtClean="0"/>
-              <a:t>成正比</a:t>
-            </a:r>
-            <a:endParaRPr lang="zh-CN" altLang="en-US" dirty="0"/>
-          </a:p>
-        </p:txBody>
-      </p:sp>
-      <p:pic>
-        <p:nvPicPr>
-          <p:cNvPr id="5" name="图片 4"/>
-          <p:cNvPicPr>
-            <a:picLocks noChangeAspect="1"/>
-          </p:cNvPicPr>
-          <p:nvPr/>
-        </p:nvPicPr>
-        <p:blipFill>
-          <a:blip r:embed="rId2"/>
-          <a:stretch>
-            <a:fillRect/>
-          </a:stretch>
-        </p:blipFill>
-        <p:spPr>
-          <a:xfrm>
-            <a:off x="628650" y="2409825"/>
-            <a:ext cx="8062379" cy="3767138"/>
-          </a:xfrm>
-          <a:prstGeom prst="rect">
-            <a:avLst/>
-          </a:prstGeom>
-        </p:spPr>
-      </p:pic>
-    </p:spTree>
-    <p:extLst>
-      <p:ext uri="{BB962C8B-B14F-4D97-AF65-F5344CB8AC3E}">
-        <p14:creationId xmlns:p14="http://schemas.microsoft.com/office/powerpoint/2010/main" val="2606915861"/>
-      </p:ext>
-    </p:extLst>
-  </p:cSld>
-  <p:clrMapOvr>
-    <a:masterClrMapping/>
-  </p:clrMapOvr>
-  <p:timing>
-    <p:tnLst>
-      <p:par>
-        <p:cTn id="1" dur="indefinite" restart="never" nodeType="tmRoot"/>
-      </p:par>
-    </p:tnLst>
-  </p:timing>
-</p:sld>
-</file>
-
-<file path=ppt/slides/slide39.xml><?xml version="1.0" encoding="utf-8"?>
-<p:sld xmlns:a="http://schemas.openxmlformats.org/drawingml/2006/main" xmlns:r="http://schemas.openxmlformats.org/officeDocument/2006/relationships" xmlns:p="http://schemas.openxmlformats.org/presentationml/2006/main">
-  <p:cSld>
-    <p:spTree>
-      <p:nvGrpSpPr>
-        <p:cNvPr id="1" name=""/>
-        <p:cNvGrpSpPr/>
-        <p:nvPr/>
-      </p:nvGrpSpPr>
-      <p:grpSpPr>
-        <a:xfrm>
-          <a:off x="0" y="0"/>
-          <a:ext cx="0" cy="0"/>
-          <a:chOff x="0" y="0"/>
-          <a:chExt cx="0" cy="0"/>
-        </a:xfrm>
-      </p:grpSpPr>
-      <p:sp>
-        <p:nvSpPr>
-          <p:cNvPr id="2" name="标题 1"/>
-          <p:cNvSpPr>
-            <a:spLocks noGrp="1"/>
-          </p:cNvSpPr>
-          <p:nvPr>
-            <p:ph type="title"/>
-          </p:nvPr>
-        </p:nvSpPr>
-        <p:spPr/>
-        <p:txBody>
-          <a:bodyPr/>
-          <a:lstStyle/>
-          <a:p>
-            <a:r>
-              <a:rPr lang="en-US" altLang="zh-CN" b="1" dirty="0" smtClean="0"/>
-              <a:t>VRPTW</a:t>
-            </a:r>
-            <a:r>
-              <a:rPr lang="zh-CN" altLang="en-US" b="1" dirty="0" smtClean="0"/>
-              <a:t>示例</a:t>
-            </a:r>
-            <a:endParaRPr lang="zh-CN" altLang="en-US" dirty="0"/>
-          </a:p>
-        </p:txBody>
-      </p:sp>
-      <p:sp>
-        <p:nvSpPr>
-          <p:cNvPr id="3" name="内容占位符 2"/>
-          <p:cNvSpPr>
-            <a:spLocks noGrp="1"/>
-          </p:cNvSpPr>
-          <p:nvPr>
-            <p:ph idx="1"/>
-          </p:nvPr>
-        </p:nvSpPr>
-        <p:spPr/>
-        <p:txBody>
-          <a:bodyPr/>
-          <a:lstStyle/>
-          <a:p>
-            <a:r>
-              <a:rPr lang="zh-CN" altLang="en-US" dirty="0"/>
-              <a:t>定义</a:t>
-            </a:r>
-            <a:r>
-              <a:rPr lang="en-US" altLang="zh-CN" dirty="0"/>
-              <a:t>callback</a:t>
-            </a:r>
-            <a:r>
-              <a:rPr lang="zh-CN" altLang="en-US" dirty="0" smtClean="0"/>
-              <a:t>函数</a:t>
-            </a:r>
-            <a:endParaRPr lang="en-US" altLang="zh-CN" dirty="0" smtClean="0"/>
-          </a:p>
-          <a:p>
-            <a:pPr marL="0" indent="0">
-              <a:buNone/>
-            </a:pPr>
-            <a:r>
-              <a:rPr lang="zh-CN" altLang="en-US" dirty="0" smtClean="0"/>
-              <a:t>    路上</a:t>
-            </a:r>
-            <a:r>
-              <a:rPr lang="zh-CN" altLang="en-US" dirty="0"/>
-              <a:t>花费的时间跟站点间的距离成正比。</a:t>
-            </a:r>
-          </a:p>
-          <a:p>
-            <a:endParaRPr lang="zh-CN" altLang="en-US" dirty="0"/>
-          </a:p>
-          <a:p>
-            <a:pPr marL="0" indent="0">
-              <a:buNone/>
-            </a:pPr>
-            <a:endParaRPr lang="zh-CN" altLang="en-US" dirty="0"/>
-          </a:p>
-        </p:txBody>
-      </p:sp>
-      <p:pic>
-        <p:nvPicPr>
-          <p:cNvPr id="4" name="图片 3"/>
-          <p:cNvPicPr>
-            <a:picLocks noChangeAspect="1"/>
-          </p:cNvPicPr>
-          <p:nvPr/>
-        </p:nvPicPr>
-        <p:blipFill>
-          <a:blip r:embed="rId2"/>
-          <a:stretch>
-            <a:fillRect/>
-          </a:stretch>
-        </p:blipFill>
-        <p:spPr>
-          <a:xfrm>
-            <a:off x="461181" y="2493545"/>
-            <a:ext cx="8221638" cy="3683418"/>
-          </a:xfrm>
-          <a:prstGeom prst="rect">
-            <a:avLst/>
-          </a:prstGeom>
-        </p:spPr>
-      </p:pic>
-    </p:spTree>
-    <p:extLst>
-      <p:ext uri="{BB962C8B-B14F-4D97-AF65-F5344CB8AC3E}">
-        <p14:creationId xmlns:p14="http://schemas.microsoft.com/office/powerpoint/2010/main" val="1082158768"/>
       </p:ext>
     </p:extLst>
   </p:cSld>
@@ -13937,6 +14921,563 @@
           <a:bodyPr/>
           <a:lstStyle/>
           <a:p>
+            <a:pPr>
+              <a:lnSpc>
+                <a:spcPct val="150000"/>
+              </a:lnSpc>
+            </a:pPr>
+            <a:r>
+              <a:rPr lang="zh-CN" altLang="en-US" dirty="0" smtClean="0"/>
+              <a:t>问题说明：</a:t>
+            </a:r>
+            <a:endParaRPr lang="en-US" altLang="zh-CN" dirty="0" smtClean="0"/>
+          </a:p>
+          <a:p>
+            <a:pPr marL="0" indent="0">
+              <a:lnSpc>
+                <a:spcPct val="150000"/>
+              </a:lnSpc>
+              <a:buNone/>
+            </a:pPr>
+            <a:r>
+              <a:rPr lang="en-US" altLang="zh-CN" dirty="0" smtClean="0"/>
+              <a:t>    VRP + Time Windows.</a:t>
+            </a:r>
+          </a:p>
+          <a:p>
+            <a:pPr marL="0" indent="0">
+              <a:lnSpc>
+                <a:spcPct val="150000"/>
+              </a:lnSpc>
+              <a:buNone/>
+            </a:pPr>
+            <a:r>
+              <a:rPr lang="zh-CN" altLang="en-US" dirty="0" smtClean="0"/>
+              <a:t>在</a:t>
+            </a:r>
+            <a:r>
+              <a:rPr lang="zh-CN" altLang="en-US" dirty="0"/>
+              <a:t>这个例子中，我们定义总的时间为服务时间</a:t>
+            </a:r>
+            <a:r>
+              <a:rPr lang="en-US" altLang="zh-CN" dirty="0"/>
+              <a:t>+</a:t>
+            </a:r>
+            <a:r>
+              <a:rPr lang="zh-CN" altLang="en-US" dirty="0"/>
+              <a:t>路上花费的时间，其中服务时间与每个站点所需货物量成正比，路上花费的时间跟站点间的距离成正比。</a:t>
+            </a:r>
+          </a:p>
+        </p:txBody>
+      </p:sp>
+    </p:spTree>
+    <p:extLst>
+      <p:ext uri="{BB962C8B-B14F-4D97-AF65-F5344CB8AC3E}">
+        <p14:creationId xmlns:p14="http://schemas.microsoft.com/office/powerpoint/2010/main" val="3000136816"/>
+      </p:ext>
+    </p:extLst>
+  </p:cSld>
+  <p:clrMapOvr>
+    <a:masterClrMapping/>
+  </p:clrMapOvr>
+  <p:timing>
+    <p:tnLst>
+      <p:par>
+        <p:cTn id="1" dur="indefinite" restart="never" nodeType="tmRoot"/>
+      </p:par>
+    </p:tnLst>
+  </p:timing>
+</p:sld>
+</file>
+
+<file path=ppt/slides/slide41.xml><?xml version="1.0" encoding="utf-8"?>
+<p:sld xmlns:a="http://schemas.openxmlformats.org/drawingml/2006/main" xmlns:r="http://schemas.openxmlformats.org/officeDocument/2006/relationships" xmlns:p="http://schemas.openxmlformats.org/presentationml/2006/main">
+  <p:cSld>
+    <p:spTree>
+      <p:nvGrpSpPr>
+        <p:cNvPr id="1" name=""/>
+        <p:cNvGrpSpPr/>
+        <p:nvPr/>
+      </p:nvGrpSpPr>
+      <p:grpSpPr>
+        <a:xfrm>
+          <a:off x="0" y="0"/>
+          <a:ext cx="0" cy="0"/>
+          <a:chOff x="0" y="0"/>
+          <a:chExt cx="0" cy="0"/>
+        </a:xfrm>
+      </p:grpSpPr>
+      <p:sp>
+        <p:nvSpPr>
+          <p:cNvPr id="2" name="标题 1"/>
+          <p:cNvSpPr>
+            <a:spLocks noGrp="1"/>
+          </p:cNvSpPr>
+          <p:nvPr>
+            <p:ph type="title"/>
+          </p:nvPr>
+        </p:nvSpPr>
+        <p:spPr/>
+        <p:txBody>
+          <a:bodyPr/>
+          <a:lstStyle/>
+          <a:p>
+            <a:r>
+              <a:rPr lang="en-US" altLang="zh-CN" b="1" dirty="0" smtClean="0"/>
+              <a:t>VRPTW</a:t>
+            </a:r>
+            <a:r>
+              <a:rPr lang="zh-CN" altLang="en-US" b="1" dirty="0" smtClean="0"/>
+              <a:t>示例</a:t>
+            </a:r>
+            <a:endParaRPr lang="zh-CN" altLang="en-US" dirty="0"/>
+          </a:p>
+        </p:txBody>
+      </p:sp>
+      <p:sp>
+        <p:nvSpPr>
+          <p:cNvPr id="3" name="内容占位符 2"/>
+          <p:cNvSpPr>
+            <a:spLocks noGrp="1"/>
+          </p:cNvSpPr>
+          <p:nvPr>
+            <p:ph idx="1"/>
+          </p:nvPr>
+        </p:nvSpPr>
+        <p:spPr/>
+        <p:txBody>
+          <a:bodyPr/>
+          <a:lstStyle/>
+          <a:p>
+            <a:pPr>
+              <a:lnSpc>
+                <a:spcPct val="150000"/>
+              </a:lnSpc>
+            </a:pPr>
+            <a:r>
+              <a:rPr lang="zh-CN" altLang="en-US" dirty="0" smtClean="0"/>
+              <a:t>准备数据：</a:t>
+            </a:r>
+            <a:endParaRPr lang="en-US" altLang="zh-CN" dirty="0" smtClean="0"/>
+          </a:p>
+          <a:p>
+            <a:pPr marL="0" indent="0">
+              <a:lnSpc>
+                <a:spcPct val="150000"/>
+              </a:lnSpc>
+              <a:buNone/>
+            </a:pPr>
+            <a:r>
+              <a:rPr lang="en-US" altLang="zh-CN" dirty="0" smtClean="0"/>
+              <a:t>    VRP + Time Windows.</a:t>
+            </a:r>
+            <a:r>
+              <a:rPr lang="zh-CN" altLang="en-US" dirty="0"/>
+              <a:t>在这个例子中，我们定义总的时间为服务时间</a:t>
+            </a:r>
+            <a:r>
+              <a:rPr lang="en-US" altLang="zh-CN" dirty="0"/>
+              <a:t>+</a:t>
+            </a:r>
+            <a:r>
+              <a:rPr lang="zh-CN" altLang="en-US" dirty="0"/>
+              <a:t>路上花费的时间，其中服务时间与每个站点所需货物量成正比，路上花费的时间跟站点间的距离成正比。</a:t>
+            </a:r>
+          </a:p>
+        </p:txBody>
+      </p:sp>
+      <p:pic>
+        <p:nvPicPr>
+          <p:cNvPr id="4" name="图片 3"/>
+          <p:cNvPicPr>
+            <a:picLocks noChangeAspect="1"/>
+          </p:cNvPicPr>
+          <p:nvPr/>
+        </p:nvPicPr>
+        <p:blipFill>
+          <a:blip r:embed="rId2"/>
+          <a:stretch>
+            <a:fillRect/>
+          </a:stretch>
+        </p:blipFill>
+        <p:spPr>
+          <a:xfrm>
+            <a:off x="508834" y="2030295"/>
+            <a:ext cx="8219977" cy="3873199"/>
+          </a:xfrm>
+          <a:prstGeom prst="rect">
+            <a:avLst/>
+          </a:prstGeom>
+        </p:spPr>
+      </p:pic>
+    </p:spTree>
+    <p:extLst>
+      <p:ext uri="{BB962C8B-B14F-4D97-AF65-F5344CB8AC3E}">
+        <p14:creationId xmlns:p14="http://schemas.microsoft.com/office/powerpoint/2010/main" val="1578707"/>
+      </p:ext>
+    </p:extLst>
+  </p:cSld>
+  <p:clrMapOvr>
+    <a:masterClrMapping/>
+  </p:clrMapOvr>
+  <p:timing>
+    <p:tnLst>
+      <p:par>
+        <p:cTn id="1" dur="indefinite" restart="never" nodeType="tmRoot"/>
+      </p:par>
+    </p:tnLst>
+  </p:timing>
+</p:sld>
+</file>
+
+<file path=ppt/slides/slide42.xml><?xml version="1.0" encoding="utf-8"?>
+<p:sld xmlns:a="http://schemas.openxmlformats.org/drawingml/2006/main" xmlns:r="http://schemas.openxmlformats.org/officeDocument/2006/relationships" xmlns:p="http://schemas.openxmlformats.org/presentationml/2006/main">
+  <p:cSld>
+    <p:spTree>
+      <p:nvGrpSpPr>
+        <p:cNvPr id="1" name=""/>
+        <p:cNvGrpSpPr/>
+        <p:nvPr/>
+      </p:nvGrpSpPr>
+      <p:grpSpPr>
+        <a:xfrm>
+          <a:off x="0" y="0"/>
+          <a:ext cx="0" cy="0"/>
+          <a:chOff x="0" y="0"/>
+          <a:chExt cx="0" cy="0"/>
+        </a:xfrm>
+      </p:grpSpPr>
+      <p:sp>
+        <p:nvSpPr>
+          <p:cNvPr id="2" name="标题 1"/>
+          <p:cNvSpPr>
+            <a:spLocks noGrp="1"/>
+          </p:cNvSpPr>
+          <p:nvPr>
+            <p:ph type="title"/>
+          </p:nvPr>
+        </p:nvSpPr>
+        <p:spPr/>
+        <p:txBody>
+          <a:bodyPr/>
+          <a:lstStyle/>
+          <a:p>
+            <a:r>
+              <a:rPr lang="en-US" altLang="zh-CN" b="1" dirty="0" smtClean="0"/>
+              <a:t>VRPTW</a:t>
+            </a:r>
+            <a:r>
+              <a:rPr lang="zh-CN" altLang="en-US" b="1" dirty="0" smtClean="0"/>
+              <a:t>示例</a:t>
+            </a:r>
+            <a:endParaRPr lang="zh-CN" altLang="en-US" dirty="0"/>
+          </a:p>
+        </p:txBody>
+      </p:sp>
+      <p:sp>
+        <p:nvSpPr>
+          <p:cNvPr id="3" name="内容占位符 2"/>
+          <p:cNvSpPr>
+            <a:spLocks noGrp="1"/>
+          </p:cNvSpPr>
+          <p:nvPr>
+            <p:ph idx="1"/>
+          </p:nvPr>
+        </p:nvSpPr>
+        <p:spPr/>
+        <p:txBody>
+          <a:bodyPr/>
+          <a:lstStyle/>
+          <a:p>
+            <a:r>
+              <a:rPr lang="zh-CN" altLang="en-US" dirty="0"/>
+              <a:t>定义</a:t>
+            </a:r>
+            <a:r>
+              <a:rPr lang="en-US" altLang="zh-CN" dirty="0"/>
+              <a:t>callback</a:t>
+            </a:r>
+            <a:r>
+              <a:rPr lang="zh-CN" altLang="en-US" dirty="0" smtClean="0"/>
+              <a:t>函数</a:t>
+            </a:r>
+            <a:r>
+              <a:rPr lang="en-US" altLang="zh-CN" dirty="0" smtClean="0"/>
+              <a:t>:</a:t>
+            </a:r>
+          </a:p>
+          <a:p>
+            <a:pPr marL="0" indent="0">
+              <a:buNone/>
+            </a:pPr>
+            <a:r>
+              <a:rPr lang="en-US" altLang="zh-CN" dirty="0"/>
+              <a:t> </a:t>
+            </a:r>
+            <a:r>
+              <a:rPr lang="en-US" altLang="zh-CN" dirty="0" smtClean="0"/>
+              <a:t> </a:t>
+            </a:r>
+            <a:r>
+              <a:rPr lang="zh-CN" altLang="en-US" dirty="0" smtClean="0"/>
+              <a:t>服务时间与</a:t>
+            </a:r>
+            <a:r>
+              <a:rPr lang="zh-CN" altLang="en-US" dirty="0"/>
+              <a:t>每个站点所需货物量</a:t>
+            </a:r>
+            <a:r>
+              <a:rPr lang="zh-CN" altLang="en-US" dirty="0" smtClean="0"/>
+              <a:t>成正比</a:t>
+            </a:r>
+            <a:endParaRPr lang="zh-CN" altLang="en-US" dirty="0"/>
+          </a:p>
+        </p:txBody>
+      </p:sp>
+      <p:pic>
+        <p:nvPicPr>
+          <p:cNvPr id="5" name="图片 4"/>
+          <p:cNvPicPr>
+            <a:picLocks noChangeAspect="1"/>
+          </p:cNvPicPr>
+          <p:nvPr/>
+        </p:nvPicPr>
+        <p:blipFill>
+          <a:blip r:embed="rId2"/>
+          <a:stretch>
+            <a:fillRect/>
+          </a:stretch>
+        </p:blipFill>
+        <p:spPr>
+          <a:xfrm>
+            <a:off x="628650" y="2409825"/>
+            <a:ext cx="8062379" cy="3767138"/>
+          </a:xfrm>
+          <a:prstGeom prst="rect">
+            <a:avLst/>
+          </a:prstGeom>
+        </p:spPr>
+      </p:pic>
+    </p:spTree>
+    <p:extLst>
+      <p:ext uri="{BB962C8B-B14F-4D97-AF65-F5344CB8AC3E}">
+        <p14:creationId xmlns:p14="http://schemas.microsoft.com/office/powerpoint/2010/main" val="2606915861"/>
+      </p:ext>
+    </p:extLst>
+  </p:cSld>
+  <p:clrMapOvr>
+    <a:masterClrMapping/>
+  </p:clrMapOvr>
+  <p:timing>
+    <p:tnLst>
+      <p:par>
+        <p:cTn id="1" dur="indefinite" restart="never" nodeType="tmRoot"/>
+      </p:par>
+    </p:tnLst>
+  </p:timing>
+</p:sld>
+</file>
+
+<file path=ppt/slides/slide43.xml><?xml version="1.0" encoding="utf-8"?>
+<p:sld xmlns:a="http://schemas.openxmlformats.org/drawingml/2006/main" xmlns:r="http://schemas.openxmlformats.org/officeDocument/2006/relationships" xmlns:p="http://schemas.openxmlformats.org/presentationml/2006/main">
+  <p:cSld>
+    <p:spTree>
+      <p:nvGrpSpPr>
+        <p:cNvPr id="1" name=""/>
+        <p:cNvGrpSpPr/>
+        <p:nvPr/>
+      </p:nvGrpSpPr>
+      <p:grpSpPr>
+        <a:xfrm>
+          <a:off x="0" y="0"/>
+          <a:ext cx="0" cy="0"/>
+          <a:chOff x="0" y="0"/>
+          <a:chExt cx="0" cy="0"/>
+        </a:xfrm>
+      </p:grpSpPr>
+      <p:sp>
+        <p:nvSpPr>
+          <p:cNvPr id="2" name="标题 1"/>
+          <p:cNvSpPr>
+            <a:spLocks noGrp="1"/>
+          </p:cNvSpPr>
+          <p:nvPr>
+            <p:ph type="title"/>
+          </p:nvPr>
+        </p:nvSpPr>
+        <p:spPr/>
+        <p:txBody>
+          <a:bodyPr/>
+          <a:lstStyle/>
+          <a:p>
+            <a:r>
+              <a:rPr lang="en-US" altLang="zh-CN" b="1" dirty="0" smtClean="0"/>
+              <a:t>VRPTW</a:t>
+            </a:r>
+            <a:r>
+              <a:rPr lang="zh-CN" altLang="en-US" b="1" dirty="0" smtClean="0"/>
+              <a:t>示例</a:t>
+            </a:r>
+            <a:endParaRPr lang="zh-CN" altLang="en-US" dirty="0"/>
+          </a:p>
+        </p:txBody>
+      </p:sp>
+      <p:sp>
+        <p:nvSpPr>
+          <p:cNvPr id="3" name="内容占位符 2"/>
+          <p:cNvSpPr>
+            <a:spLocks noGrp="1"/>
+          </p:cNvSpPr>
+          <p:nvPr>
+            <p:ph idx="1"/>
+          </p:nvPr>
+        </p:nvSpPr>
+        <p:spPr/>
+        <p:txBody>
+          <a:bodyPr/>
+          <a:lstStyle/>
+          <a:p>
+            <a:r>
+              <a:rPr lang="zh-CN" altLang="en-US" dirty="0"/>
+              <a:t>定义</a:t>
+            </a:r>
+            <a:r>
+              <a:rPr lang="en-US" altLang="zh-CN" dirty="0"/>
+              <a:t>callback</a:t>
+            </a:r>
+            <a:r>
+              <a:rPr lang="zh-CN" altLang="en-US" dirty="0" smtClean="0"/>
+              <a:t>函数</a:t>
+            </a:r>
+            <a:endParaRPr lang="en-US" altLang="zh-CN" dirty="0" smtClean="0"/>
+          </a:p>
+          <a:p>
+            <a:pPr marL="0" indent="0">
+              <a:buNone/>
+            </a:pPr>
+            <a:r>
+              <a:rPr lang="zh-CN" altLang="en-US" dirty="0" smtClean="0"/>
+              <a:t>    路上</a:t>
+            </a:r>
+            <a:r>
+              <a:rPr lang="zh-CN" altLang="en-US" dirty="0"/>
+              <a:t>花费的时间跟站点间的距离成正比。</a:t>
+            </a:r>
+          </a:p>
+          <a:p>
+            <a:endParaRPr lang="zh-CN" altLang="en-US" dirty="0"/>
+          </a:p>
+          <a:p>
+            <a:pPr marL="0" indent="0">
+              <a:buNone/>
+            </a:pPr>
+            <a:endParaRPr lang="zh-CN" altLang="en-US" dirty="0"/>
+          </a:p>
+        </p:txBody>
+      </p:sp>
+      <p:pic>
+        <p:nvPicPr>
+          <p:cNvPr id="4" name="图片 3"/>
+          <p:cNvPicPr>
+            <a:picLocks noChangeAspect="1"/>
+          </p:cNvPicPr>
+          <p:nvPr/>
+        </p:nvPicPr>
+        <p:blipFill>
+          <a:blip r:embed="rId2"/>
+          <a:stretch>
+            <a:fillRect/>
+          </a:stretch>
+        </p:blipFill>
+        <p:spPr>
+          <a:xfrm>
+            <a:off x="461181" y="2493545"/>
+            <a:ext cx="8221638" cy="3683418"/>
+          </a:xfrm>
+          <a:prstGeom prst="rect">
+            <a:avLst/>
+          </a:prstGeom>
+        </p:spPr>
+      </p:pic>
+    </p:spTree>
+    <p:extLst>
+      <p:ext uri="{BB962C8B-B14F-4D97-AF65-F5344CB8AC3E}">
+        <p14:creationId xmlns:p14="http://schemas.microsoft.com/office/powerpoint/2010/main" val="1082158768"/>
+      </p:ext>
+    </p:extLst>
+  </p:cSld>
+  <p:clrMapOvr>
+    <a:masterClrMapping/>
+  </p:clrMapOvr>
+  <p:timing>
+    <p:tnLst>
+      <p:par>
+        <p:cTn id="1" dur="indefinite" restart="never" nodeType="tmRoot"/>
+      </p:par>
+    </p:tnLst>
+  </p:timing>
+</p:sld>
+</file>
+
+<file path=ppt/slides/slide44.xml><?xml version="1.0" encoding="utf-8"?>
+<p:sld xmlns:a="http://schemas.openxmlformats.org/drawingml/2006/main" xmlns:r="http://schemas.openxmlformats.org/officeDocument/2006/relationships" xmlns:p="http://schemas.openxmlformats.org/presentationml/2006/main">
+  <p:cSld>
+    <p:spTree>
+      <p:nvGrpSpPr>
+        <p:cNvPr id="1" name=""/>
+        <p:cNvGrpSpPr/>
+        <p:nvPr/>
+      </p:nvGrpSpPr>
+      <p:grpSpPr>
+        <a:xfrm>
+          <a:off x="0" y="0"/>
+          <a:ext cx="0" cy="0"/>
+          <a:chOff x="0" y="0"/>
+          <a:chExt cx="0" cy="0"/>
+        </a:xfrm>
+      </p:grpSpPr>
+      <p:sp>
+        <p:nvSpPr>
+          <p:cNvPr id="2" name="标题 1"/>
+          <p:cNvSpPr>
+            <a:spLocks noGrp="1"/>
+          </p:cNvSpPr>
+          <p:nvPr>
+            <p:ph type="title"/>
+          </p:nvPr>
+        </p:nvSpPr>
+        <p:spPr/>
+        <p:txBody>
+          <a:bodyPr/>
+          <a:lstStyle/>
+          <a:p>
+            <a:r>
+              <a:rPr lang="en-US" altLang="zh-CN" b="1" dirty="0" smtClean="0"/>
+              <a:t>VRPTW</a:t>
+            </a:r>
+            <a:r>
+              <a:rPr lang="zh-CN" altLang="en-US" b="1" dirty="0" smtClean="0"/>
+              <a:t>示例</a:t>
+            </a:r>
+            <a:endParaRPr lang="zh-CN" altLang="en-US" dirty="0"/>
+          </a:p>
+        </p:txBody>
+      </p:sp>
+      <p:sp>
+        <p:nvSpPr>
+          <p:cNvPr id="3" name="内容占位符 2"/>
+          <p:cNvSpPr>
+            <a:spLocks noGrp="1"/>
+          </p:cNvSpPr>
+          <p:nvPr>
+            <p:ph idx="1"/>
+          </p:nvPr>
+        </p:nvSpPr>
+        <p:spPr/>
+        <p:txBody>
+          <a:bodyPr/>
+          <a:lstStyle/>
+          <a:p>
             <a:r>
               <a:rPr lang="zh-CN" altLang="en-US" dirty="0"/>
               <a:t>定义</a:t>
@@ -14033,7 +15574,7 @@
 </p:sld>
 </file>
 
-<file path=ppt/slides/slide41.xml><?xml version="1.0" encoding="utf-8"?>
+<file path=ppt/slides/slide45.xml><?xml version="1.0" encoding="utf-8"?>
 <p:sld xmlns:a="http://schemas.openxmlformats.org/drawingml/2006/main" xmlns:r="http://schemas.openxmlformats.org/officeDocument/2006/relationships" xmlns:p="http://schemas.openxmlformats.org/presentationml/2006/main">
   <p:cSld>
     <p:spTree>
@@ -14236,7 +15777,7 @@
 </p:sld>
 </file>
 
-<file path=ppt/slides/slide42.xml><?xml version="1.0" encoding="utf-8"?>
+<file path=ppt/slides/slide46.xml><?xml version="1.0" encoding="utf-8"?>
 <p:sld xmlns:a="http://schemas.openxmlformats.org/drawingml/2006/main" xmlns:r="http://schemas.openxmlformats.org/officeDocument/2006/relationships" xmlns:p="http://schemas.openxmlformats.org/presentationml/2006/main">
   <p:cSld>
     <p:spTree>
@@ -14292,7 +15833,9 @@
         </p:nvSpPr>
         <p:spPr/>
         <p:txBody>
-          <a:bodyPr/>
+          <a:bodyPr>
+            <a:normAutofit/>
+          </a:bodyPr>
           <a:lstStyle/>
           <a:p>
             <a:pPr marL="0" indent="0">
@@ -14339,7 +15882,7 @@
             </a:pPr>
             <a:r>
               <a:rPr lang="zh-CN" altLang="en-US" b="1" dirty="0" smtClean="0"/>
-              <a:t>为其中的每个站点设置开始、结束时间值</a:t>
+              <a:t>为其中的每个站点设置开始、结束时间值，加入约束</a:t>
             </a:r>
             <a:endParaRPr lang="en-US" altLang="zh-CN" b="1" dirty="0" smtClean="0"/>
           </a:p>
@@ -14360,28 +15903,6 @@
               <a:buAutoNum type="arabicPeriod"/>
             </a:pPr>
             <a:endParaRPr lang="en-US" altLang="zh-CN" b="1" dirty="0"/>
-          </a:p>
-          <a:p>
-            <a:pPr marL="514350" indent="-514350">
-              <a:buAutoNum type="arabicPeriod"/>
-            </a:pPr>
-            <a:r>
-              <a:rPr lang="zh-CN" altLang="en-US" b="1" dirty="0" smtClean="0"/>
-              <a:t>加入约束</a:t>
-            </a:r>
-            <a:endParaRPr lang="en-US" altLang="zh-CN" b="1" dirty="0" smtClean="0"/>
-          </a:p>
-          <a:p>
-            <a:pPr marL="0" indent="0">
-              <a:buNone/>
-            </a:pPr>
-            <a:endParaRPr lang="en-US" altLang="zh-CN" b="1" dirty="0" smtClean="0"/>
-          </a:p>
-          <a:p>
-            <a:pPr marL="514350" indent="-514350">
-              <a:buAutoNum type="arabicPeriod"/>
-            </a:pPr>
-            <a:endParaRPr lang="en-US" altLang="zh-CN" b="1" dirty="0" smtClean="0"/>
           </a:p>
           <a:p>
             <a:pPr marL="514350" indent="-514350">
@@ -14440,32 +15961,8 @@
         </p:blipFill>
         <p:spPr>
           <a:xfrm>
-            <a:off x="878065" y="3896022"/>
+            <a:off x="878065" y="4388391"/>
             <a:ext cx="7387867" cy="1352708"/>
-          </a:xfrm>
-          <a:prstGeom prst="rect">
-            <a:avLst/>
-          </a:prstGeom>
-        </p:spPr>
-      </p:pic>
-      <p:pic>
-        <p:nvPicPr>
-          <p:cNvPr id="7" name="图片 6"/>
-          <p:cNvPicPr>
-            <a:picLocks noChangeAspect="1"/>
-          </p:cNvPicPr>
-          <p:nvPr/>
-        </p:nvPicPr>
-        <p:blipFill>
-          <a:blip r:embed="rId4"/>
-          <a:stretch>
-            <a:fillRect/>
-          </a:stretch>
-        </p:blipFill>
-        <p:spPr>
-          <a:xfrm>
-            <a:off x="753357" y="5893200"/>
-            <a:ext cx="7637282" cy="567526"/>
           </a:xfrm>
           <a:prstGeom prst="rect">
             <a:avLst/>
@@ -14492,7 +15989,7 @@
 </p:sld>
 </file>
 
-<file path=ppt/slides/slide43.xml><?xml version="1.0" encoding="utf-8"?>
+<file path=ppt/slides/slide47.xml><?xml version="1.0" encoding="utf-8"?>
 <p:sld xmlns:a="http://schemas.openxmlformats.org/drawingml/2006/main" xmlns:r="http://schemas.openxmlformats.org/officeDocument/2006/relationships" xmlns:p="http://schemas.openxmlformats.org/presentationml/2006/main">
   <p:cSld>
     <p:spTree>
@@ -14556,7 +16053,7 @@
 </p:sld>
 </file>
 
-<file path=ppt/slides/slide44.xml><?xml version="1.0" encoding="utf-8"?>
+<file path=ppt/slides/slide48.xml><?xml version="1.0" encoding="utf-8"?>
 <p:sld xmlns:a="http://schemas.openxmlformats.org/drawingml/2006/main" xmlns:r="http://schemas.openxmlformats.org/officeDocument/2006/relationships" xmlns:p="http://schemas.openxmlformats.org/presentationml/2006/main">
   <p:cSld>
     <p:spTree>
@@ -15096,6 +16593,30 @@
           </a:prstGeom>
         </p:spPr>
       </p:pic>
+      <p:pic>
+        <p:nvPicPr>
+          <p:cNvPr id="4" name="图片 3"/>
+          <p:cNvPicPr>
+            <a:picLocks noChangeAspect="1"/>
+          </p:cNvPicPr>
+          <p:nvPr/>
+        </p:nvPicPr>
+        <p:blipFill>
+          <a:blip r:embed="rId5"/>
+          <a:stretch>
+            <a:fillRect/>
+          </a:stretch>
+        </p:blipFill>
+        <p:spPr>
+          <a:xfrm>
+            <a:off x="2505404" y="3394774"/>
+            <a:ext cx="4133191" cy="3140057"/>
+          </a:xfrm>
+          <a:prstGeom prst="rect">
+            <a:avLst/>
+          </a:prstGeom>
+        </p:spPr>
+      </p:pic>
     </p:spTree>
     <p:extLst>
       <p:ext uri="{BB962C8B-B14F-4D97-AF65-F5344CB8AC3E}">
@@ -15537,8 +17058,8 @@
           </a:p>
         </p:txBody>
       </p:sp>
-      <mc:AlternateContent xmlns:mc="http://schemas.openxmlformats.org/markup-compatibility/2006">
-        <mc:Choice xmlns:a14="http://schemas.microsoft.com/office/drawing/2010/main" Requires="a14">
+      <mc:AlternateContent xmlns:mc="http://schemas.openxmlformats.org/markup-compatibility/2006" xmlns:a14="http://schemas.microsoft.com/office/drawing/2010/main">
+        <mc:Choice Requires="a14">
           <p:sp>
             <p:nvSpPr>
               <p:cNvPr id="3" name="内容占位符 2"/>
@@ -15583,11 +17104,7 @@
                 </a14:m>
                 <a:r>
                   <a:rPr lang="zh-CN" altLang="en-US" sz="2000" dirty="0"/>
-                  <a:t>标记这些城市，并</a:t>
-                </a:r>
-                <a:r>
-                  <a:rPr lang="zh-CN" altLang="en-US" sz="2000" dirty="0"/>
-                  <a:t>定义</a:t>
+                  <a:t>标记这些城市，并定义</a:t>
                 </a:r>
                 <a:endParaRPr lang="en-US" altLang="zh-CN" sz="2000" dirty="0"/>
               </a:p>
@@ -15668,19 +17185,7 @@
                                 <a:rPr lang="zh-CN" altLang="en-US" sz="2000" i="1">
                                   <a:latin typeface="Cambria Math" panose="02040503050406030204" pitchFamily="18" charset="0"/>
                                 </a:rPr>
-                                <m:t>路径</m:t>
-                              </m:r>
-                              <m:r>
-                                <a:rPr lang="zh-CN" altLang="en-US" sz="2000" i="1">
-                                  <a:latin typeface="Cambria Math" panose="02040503050406030204" pitchFamily="18" charset="0"/>
-                                </a:rPr>
-                                <m:t>选择</m:t>
-                              </m:r>
-                              <m:r>
-                                <a:rPr lang="zh-CN" altLang="en-US" sz="2000" i="1">
-                                  <a:latin typeface="Cambria Math" panose="02040503050406030204" pitchFamily="18" charset="0"/>
-                                </a:rPr>
-                                <m:t>从</m:t>
+                                <m:t>路径选择从</m:t>
                               </m:r>
                               <m:r>
                                 <m:rPr>
@@ -15746,7 +17251,6 @@
                   <a:rPr lang="zh-CN" altLang="en-US" sz="2000" dirty="0"/>
                   <a:t>并选择优化：</a:t>
                 </a:r>
-                <a:endParaRPr lang="zh-CN" altLang="en-US" sz="2000" dirty="0"/>
               </a:p>
               <a:p>
                 <a:endParaRPr lang="zh-CN" altLang="en-US" sz="2000" dirty="0"/>
@@ -15754,7 +17258,7 @@
             </p:txBody>
           </p:sp>
         </mc:Choice>
-        <mc:Fallback>
+        <mc:Fallback xmlns="">
           <p:sp>
             <p:nvSpPr>
               <p:cNvPr id="3" name="内容占位符 2"/>
@@ -15834,6 +17338,52 @@
           </a:prstGeom>
         </p:spPr>
       </p:pic>
+      <p:pic>
+        <p:nvPicPr>
+          <p:cNvPr id="6" name="图片 5"/>
+          <p:cNvPicPr>
+            <a:picLocks noChangeAspect="1"/>
+          </p:cNvPicPr>
+          <p:nvPr/>
+        </p:nvPicPr>
+        <p:blipFill rotWithShape="1">
+          <a:blip r:embed="rId5"/>
+          <a:srcRect r="460" b="43671"/>
+          <a:stretch/>
+        </p:blipFill>
+        <p:spPr>
+          <a:xfrm>
+            <a:off x="777289" y="4002294"/>
+            <a:ext cx="4018478" cy="2311402"/>
+          </a:xfrm>
+          <a:prstGeom prst="rect">
+            <a:avLst/>
+          </a:prstGeom>
+        </p:spPr>
+      </p:pic>
+      <p:pic>
+        <p:nvPicPr>
+          <p:cNvPr id="7" name="图片 6"/>
+          <p:cNvPicPr>
+            <a:picLocks noChangeAspect="1"/>
+          </p:cNvPicPr>
+          <p:nvPr/>
+        </p:nvPicPr>
+        <p:blipFill rotWithShape="1">
+          <a:blip r:embed="rId5"/>
+          <a:srcRect t="54860"/>
+          <a:stretch/>
+        </p:blipFill>
+        <p:spPr>
+          <a:xfrm>
+            <a:off x="4391025" y="4078922"/>
+            <a:ext cx="4623949" cy="2121580"/>
+          </a:xfrm>
+          <a:prstGeom prst="rect">
+            <a:avLst/>
+          </a:prstGeom>
+        </p:spPr>
+      </p:pic>
     </p:spTree>
     <p:extLst>
       <p:ext uri="{BB962C8B-B14F-4D97-AF65-F5344CB8AC3E}">
@@ -15993,10 +17543,6 @@
               <a:rPr lang="zh-CN" altLang="en-US" sz="2200" dirty="0"/>
               <a:t>）</a:t>
             </a:r>
-            <a:r>
-              <a:rPr lang="zh-CN" altLang="en-US" sz="2200" dirty="0"/>
-              <a:t/>
-            </a:r>
             <a:br>
               <a:rPr lang="zh-CN" altLang="en-US" sz="2200" dirty="0"/>
             </a:br>
@@ -16062,11 +17608,11 @@
   <p:clrMapOvr>
     <a:masterClrMapping/>
   </p:clrMapOvr>
-  <mc:AlternateContent xmlns:mc="http://schemas.openxmlformats.org/markup-compatibility/2006">
-    <mc:Choice xmlns:p14="http://schemas.microsoft.com/office/powerpoint/2010/main" Requires="p14">
+  <mc:AlternateContent xmlns:mc="http://schemas.openxmlformats.org/markup-compatibility/2006" xmlns:p14="http://schemas.microsoft.com/office/powerpoint/2010/main">
+    <mc:Choice Requires="p14">
       <p:transition spd="slow" p14:dur="2000"/>
     </mc:Choice>
-    <mc:Fallback>
+    <mc:Fallback xmlns="">
       <p:transition spd="slow"/>
     </mc:Fallback>
   </mc:AlternateContent>

</xml_diff>